<commit_message>
Added last modified files by adding password verification, display uploaded image and add ppt and video
</commit_message>
<xml_diff>
--- a/Licenta2019RomanStefan/VoteIT.pptx
+++ b/Licenta2019RomanStefan/VoteIT.pptx
@@ -4,13 +4,17 @@
   <p:sldMasterIdLst>
     <p:sldMasterId id="2147483660" r:id="rId1"/>
   </p:sldMasterIdLst>
+  <p:notesMasterIdLst>
+    <p:notesMasterId r:id="rId9"/>
+  </p:notesMasterIdLst>
   <p:sldIdLst>
     <p:sldId id="256" r:id="rId2"/>
     <p:sldId id="257" r:id="rId3"/>
     <p:sldId id="258" r:id="rId4"/>
     <p:sldId id="259" r:id="rId5"/>
-    <p:sldId id="260" r:id="rId6"/>
-    <p:sldId id="261" r:id="rId7"/>
+    <p:sldId id="262" r:id="rId6"/>
+    <p:sldId id="260" r:id="rId7"/>
+    <p:sldId id="261" r:id="rId8"/>
   </p:sldIdLst>
   <p:sldSz cx="12192000" cy="6858000"/>
   <p:notesSz cx="6858000" cy="9144000"/>
@@ -115,6 +119,1254 @@
     </p:ext>
   </p:extLst>
 </p:presentation>
+</file>
+
+<file path=ppt/notesMasters/notesMaster1.xml><?xml version="1.0" encoding="utf-8"?>
+<p:notesMaster xmlns:a="http://schemas.openxmlformats.org/drawingml/2006/main" xmlns:r="http://schemas.openxmlformats.org/officeDocument/2006/relationships" xmlns:p="http://schemas.openxmlformats.org/presentationml/2006/main">
+  <p:cSld>
+    <p:bg>
+      <p:bgRef idx="1001">
+        <a:schemeClr val="bg1"/>
+      </p:bgRef>
+    </p:bg>
+    <p:spTree>
+      <p:nvGrpSpPr>
+        <p:cNvPr id="1" name=""/>
+        <p:cNvGrpSpPr/>
+        <p:nvPr/>
+      </p:nvGrpSpPr>
+      <p:grpSpPr>
+        <a:xfrm>
+          <a:off x="0" y="0"/>
+          <a:ext cx="0" cy="0"/>
+          <a:chOff x="0" y="0"/>
+          <a:chExt cx="0" cy="0"/>
+        </a:xfrm>
+      </p:grpSpPr>
+      <p:sp>
+        <p:nvSpPr>
+          <p:cNvPr id="2" name="Substituent antet 1"/>
+          <p:cNvSpPr>
+            <a:spLocks noGrp="1"/>
+          </p:cNvSpPr>
+          <p:nvPr>
+            <p:ph type="hdr" sz="quarter"/>
+          </p:nvPr>
+        </p:nvSpPr>
+        <p:spPr>
+          <a:xfrm>
+            <a:off x="0" y="0"/>
+            <a:ext cx="2971800" cy="458788"/>
+          </a:xfrm>
+          <a:prstGeom prst="rect">
+            <a:avLst/>
+          </a:prstGeom>
+        </p:spPr>
+        <p:txBody>
+          <a:bodyPr vert="horz" lIns="91440" tIns="45720" rIns="91440" bIns="45720" rtlCol="0"/>
+          <a:lstStyle>
+            <a:lvl1pPr algn="l">
+              <a:defRPr sz="1200"/>
+            </a:lvl1pPr>
+          </a:lstStyle>
+          <a:p>
+            <a:endParaRPr lang="en-US"/>
+          </a:p>
+        </p:txBody>
+      </p:sp>
+      <p:sp>
+        <p:nvSpPr>
+          <p:cNvPr id="3" name="Substituent dată 2"/>
+          <p:cNvSpPr>
+            <a:spLocks noGrp="1"/>
+          </p:cNvSpPr>
+          <p:nvPr>
+            <p:ph type="dt" idx="1"/>
+          </p:nvPr>
+        </p:nvSpPr>
+        <p:spPr>
+          <a:xfrm>
+            <a:off x="3884613" y="0"/>
+            <a:ext cx="2971800" cy="458788"/>
+          </a:xfrm>
+          <a:prstGeom prst="rect">
+            <a:avLst/>
+          </a:prstGeom>
+        </p:spPr>
+        <p:txBody>
+          <a:bodyPr vert="horz" lIns="91440" tIns="45720" rIns="91440" bIns="45720" rtlCol="0"/>
+          <a:lstStyle>
+            <a:lvl1pPr algn="r">
+              <a:defRPr sz="1200"/>
+            </a:lvl1pPr>
+          </a:lstStyle>
+          <a:p>
+            <a:fld id="{8EA86561-26E6-42B4-B42F-0E504CC74B0E}" type="datetimeFigureOut">
+              <a:rPr lang="en-US" smtClean="0"/>
+              <a:t>7/2/2019</a:t>
+            </a:fld>
+            <a:endParaRPr lang="en-US"/>
+          </a:p>
+        </p:txBody>
+      </p:sp>
+      <p:sp>
+        <p:nvSpPr>
+          <p:cNvPr id="4" name="Substituent imagine diapozitiv 3"/>
+          <p:cNvSpPr>
+            <a:spLocks noGrp="1" noRot="1" noChangeAspect="1"/>
+          </p:cNvSpPr>
+          <p:nvPr>
+            <p:ph type="sldImg" idx="2"/>
+          </p:nvPr>
+        </p:nvSpPr>
+        <p:spPr>
+          <a:xfrm>
+            <a:off x="685800" y="1143000"/>
+            <a:ext cx="5486400" cy="3086100"/>
+          </a:xfrm>
+          <a:prstGeom prst="rect">
+            <a:avLst/>
+          </a:prstGeom>
+          <a:noFill/>
+          <a:ln w="12700">
+            <a:solidFill>
+              <a:prstClr val="black"/>
+            </a:solidFill>
+          </a:ln>
+        </p:spPr>
+        <p:txBody>
+          <a:bodyPr vert="horz" lIns="91440" tIns="45720" rIns="91440" bIns="45720" rtlCol="0" anchor="ctr"/>
+          <a:lstStyle/>
+          <a:p>
+            <a:endParaRPr lang="en-US"/>
+          </a:p>
+        </p:txBody>
+      </p:sp>
+      <p:sp>
+        <p:nvSpPr>
+          <p:cNvPr id="5" name="Substituent note 4"/>
+          <p:cNvSpPr>
+            <a:spLocks noGrp="1"/>
+          </p:cNvSpPr>
+          <p:nvPr>
+            <p:ph type="body" sz="quarter" idx="3"/>
+          </p:nvPr>
+        </p:nvSpPr>
+        <p:spPr>
+          <a:xfrm>
+            <a:off x="685800" y="4400550"/>
+            <a:ext cx="5486400" cy="3600450"/>
+          </a:xfrm>
+          <a:prstGeom prst="rect">
+            <a:avLst/>
+          </a:prstGeom>
+        </p:spPr>
+        <p:txBody>
+          <a:bodyPr vert="horz" lIns="91440" tIns="45720" rIns="91440" bIns="45720" rtlCol="0"/>
+          <a:lstStyle/>
+          <a:p>
+            <a:pPr lvl="0"/>
+            <a:r>
+              <a:rPr lang="ro-RO"/>
+              <a:t>Editați stilurile de text coordonator</a:t>
+            </a:r>
+          </a:p>
+          <a:p>
+            <a:pPr lvl="1"/>
+            <a:r>
+              <a:rPr lang="ro-RO"/>
+              <a:t>Al doilea nivel</a:t>
+            </a:r>
+          </a:p>
+          <a:p>
+            <a:pPr lvl="2"/>
+            <a:r>
+              <a:rPr lang="ro-RO"/>
+              <a:t>Al treilea nivel</a:t>
+            </a:r>
+          </a:p>
+          <a:p>
+            <a:pPr lvl="3"/>
+            <a:r>
+              <a:rPr lang="ro-RO"/>
+              <a:t>Al patrulea nivel</a:t>
+            </a:r>
+          </a:p>
+          <a:p>
+            <a:pPr lvl="4"/>
+            <a:r>
+              <a:rPr lang="ro-RO"/>
+              <a:t>Al cincilea nivel</a:t>
+            </a:r>
+            <a:endParaRPr lang="en-US"/>
+          </a:p>
+        </p:txBody>
+      </p:sp>
+      <p:sp>
+        <p:nvSpPr>
+          <p:cNvPr id="6" name="Substituent subsol 5"/>
+          <p:cNvSpPr>
+            <a:spLocks noGrp="1"/>
+          </p:cNvSpPr>
+          <p:nvPr>
+            <p:ph type="ftr" sz="quarter" idx="4"/>
+          </p:nvPr>
+        </p:nvSpPr>
+        <p:spPr>
+          <a:xfrm>
+            <a:off x="0" y="8685213"/>
+            <a:ext cx="2971800" cy="458787"/>
+          </a:xfrm>
+          <a:prstGeom prst="rect">
+            <a:avLst/>
+          </a:prstGeom>
+        </p:spPr>
+        <p:txBody>
+          <a:bodyPr vert="horz" lIns="91440" tIns="45720" rIns="91440" bIns="45720" rtlCol="0" anchor="b"/>
+          <a:lstStyle>
+            <a:lvl1pPr algn="l">
+              <a:defRPr sz="1200"/>
+            </a:lvl1pPr>
+          </a:lstStyle>
+          <a:p>
+            <a:endParaRPr lang="en-US"/>
+          </a:p>
+        </p:txBody>
+      </p:sp>
+      <p:sp>
+        <p:nvSpPr>
+          <p:cNvPr id="7" name="Substituent număr diapozitiv 6"/>
+          <p:cNvSpPr>
+            <a:spLocks noGrp="1"/>
+          </p:cNvSpPr>
+          <p:nvPr>
+            <p:ph type="sldNum" sz="quarter" idx="5"/>
+          </p:nvPr>
+        </p:nvSpPr>
+        <p:spPr>
+          <a:xfrm>
+            <a:off x="3884613" y="8685213"/>
+            <a:ext cx="2971800" cy="458787"/>
+          </a:xfrm>
+          <a:prstGeom prst="rect">
+            <a:avLst/>
+          </a:prstGeom>
+        </p:spPr>
+        <p:txBody>
+          <a:bodyPr vert="horz" lIns="91440" tIns="45720" rIns="91440" bIns="45720" rtlCol="0" anchor="b"/>
+          <a:lstStyle>
+            <a:lvl1pPr algn="r">
+              <a:defRPr sz="1200"/>
+            </a:lvl1pPr>
+          </a:lstStyle>
+          <a:p>
+            <a:fld id="{39C13B9E-123D-412D-A459-0F0A854DD546}" type="slidenum">
+              <a:rPr lang="en-US" smtClean="0"/>
+              <a:t>‹#›</a:t>
+            </a:fld>
+            <a:endParaRPr lang="en-US"/>
+          </a:p>
+        </p:txBody>
+      </p:sp>
+    </p:spTree>
+    <p:extLst>
+      <p:ext uri="{BB962C8B-B14F-4D97-AF65-F5344CB8AC3E}">
+        <p14:creationId xmlns:p14="http://schemas.microsoft.com/office/powerpoint/2010/main" val="1919556414"/>
+      </p:ext>
+    </p:extLst>
+  </p:cSld>
+  <p:clrMap bg1="lt1" tx1="dk1" bg2="lt2" tx2="dk2" accent1="accent1" accent2="accent2" accent3="accent3" accent4="accent4" accent5="accent5" accent6="accent6" hlink="hlink" folHlink="folHlink"/>
+  <p:notesStyle>
+    <a:lvl1pPr marL="0" algn="l" defTabSz="914400" rtl="0" eaLnBrk="1" latinLnBrk="0" hangingPunct="1">
+      <a:defRPr sz="1200" kern="1200">
+        <a:solidFill>
+          <a:schemeClr val="tx1"/>
+        </a:solidFill>
+        <a:latin typeface="+mn-lt"/>
+        <a:ea typeface="+mn-ea"/>
+        <a:cs typeface="+mn-cs"/>
+      </a:defRPr>
+    </a:lvl1pPr>
+    <a:lvl2pPr marL="457200" algn="l" defTabSz="914400" rtl="0" eaLnBrk="1" latinLnBrk="0" hangingPunct="1">
+      <a:defRPr sz="1200" kern="1200">
+        <a:solidFill>
+          <a:schemeClr val="tx1"/>
+        </a:solidFill>
+        <a:latin typeface="+mn-lt"/>
+        <a:ea typeface="+mn-ea"/>
+        <a:cs typeface="+mn-cs"/>
+      </a:defRPr>
+    </a:lvl2pPr>
+    <a:lvl3pPr marL="914400" algn="l" defTabSz="914400" rtl="0" eaLnBrk="1" latinLnBrk="0" hangingPunct="1">
+      <a:defRPr sz="1200" kern="1200">
+        <a:solidFill>
+          <a:schemeClr val="tx1"/>
+        </a:solidFill>
+        <a:latin typeface="+mn-lt"/>
+        <a:ea typeface="+mn-ea"/>
+        <a:cs typeface="+mn-cs"/>
+      </a:defRPr>
+    </a:lvl3pPr>
+    <a:lvl4pPr marL="1371600" algn="l" defTabSz="914400" rtl="0" eaLnBrk="1" latinLnBrk="0" hangingPunct="1">
+      <a:defRPr sz="1200" kern="1200">
+        <a:solidFill>
+          <a:schemeClr val="tx1"/>
+        </a:solidFill>
+        <a:latin typeface="+mn-lt"/>
+        <a:ea typeface="+mn-ea"/>
+        <a:cs typeface="+mn-cs"/>
+      </a:defRPr>
+    </a:lvl4pPr>
+    <a:lvl5pPr marL="1828800" algn="l" defTabSz="914400" rtl="0" eaLnBrk="1" latinLnBrk="0" hangingPunct="1">
+      <a:defRPr sz="1200" kern="1200">
+        <a:solidFill>
+          <a:schemeClr val="tx1"/>
+        </a:solidFill>
+        <a:latin typeface="+mn-lt"/>
+        <a:ea typeface="+mn-ea"/>
+        <a:cs typeface="+mn-cs"/>
+      </a:defRPr>
+    </a:lvl5pPr>
+    <a:lvl6pPr marL="2286000" algn="l" defTabSz="914400" rtl="0" eaLnBrk="1" latinLnBrk="0" hangingPunct="1">
+      <a:defRPr sz="1200" kern="1200">
+        <a:solidFill>
+          <a:schemeClr val="tx1"/>
+        </a:solidFill>
+        <a:latin typeface="+mn-lt"/>
+        <a:ea typeface="+mn-ea"/>
+        <a:cs typeface="+mn-cs"/>
+      </a:defRPr>
+    </a:lvl6pPr>
+    <a:lvl7pPr marL="2743200" algn="l" defTabSz="914400" rtl="0" eaLnBrk="1" latinLnBrk="0" hangingPunct="1">
+      <a:defRPr sz="1200" kern="1200">
+        <a:solidFill>
+          <a:schemeClr val="tx1"/>
+        </a:solidFill>
+        <a:latin typeface="+mn-lt"/>
+        <a:ea typeface="+mn-ea"/>
+        <a:cs typeface="+mn-cs"/>
+      </a:defRPr>
+    </a:lvl7pPr>
+    <a:lvl8pPr marL="3200400" algn="l" defTabSz="914400" rtl="0" eaLnBrk="1" latinLnBrk="0" hangingPunct="1">
+      <a:defRPr sz="1200" kern="1200">
+        <a:solidFill>
+          <a:schemeClr val="tx1"/>
+        </a:solidFill>
+        <a:latin typeface="+mn-lt"/>
+        <a:ea typeface="+mn-ea"/>
+        <a:cs typeface="+mn-cs"/>
+      </a:defRPr>
+    </a:lvl8pPr>
+    <a:lvl9pPr marL="3657600" algn="l" defTabSz="914400" rtl="0" eaLnBrk="1" latinLnBrk="0" hangingPunct="1">
+      <a:defRPr sz="1200" kern="1200">
+        <a:solidFill>
+          <a:schemeClr val="tx1"/>
+        </a:solidFill>
+        <a:latin typeface="+mn-lt"/>
+        <a:ea typeface="+mn-ea"/>
+        <a:cs typeface="+mn-cs"/>
+      </a:defRPr>
+    </a:lvl9pPr>
+  </p:notesStyle>
+</p:notesMaster>
+</file>
+
+<file path=ppt/notesSlides/notesSlide1.xml><?xml version="1.0" encoding="utf-8"?>
+<p:notes xmlns:a="http://schemas.openxmlformats.org/drawingml/2006/main" xmlns:r="http://schemas.openxmlformats.org/officeDocument/2006/relationships" xmlns:p="http://schemas.openxmlformats.org/presentationml/2006/main">
+  <p:cSld>
+    <p:spTree>
+      <p:nvGrpSpPr>
+        <p:cNvPr id="1" name=""/>
+        <p:cNvGrpSpPr/>
+        <p:nvPr/>
+      </p:nvGrpSpPr>
+      <p:grpSpPr>
+        <a:xfrm>
+          <a:off x="0" y="0"/>
+          <a:ext cx="0" cy="0"/>
+          <a:chOff x="0" y="0"/>
+          <a:chExt cx="0" cy="0"/>
+        </a:xfrm>
+      </p:grpSpPr>
+      <p:sp>
+        <p:nvSpPr>
+          <p:cNvPr id="2" name="Substituent imagine diapozitiv 1"/>
+          <p:cNvSpPr>
+            <a:spLocks noGrp="1" noRot="1" noChangeAspect="1"/>
+          </p:cNvSpPr>
+          <p:nvPr>
+            <p:ph type="sldImg"/>
+          </p:nvPr>
+        </p:nvSpPr>
+        <p:spPr/>
+      </p:sp>
+      <p:sp>
+        <p:nvSpPr>
+          <p:cNvPr id="3" name="Substituent note 2"/>
+          <p:cNvSpPr>
+            <a:spLocks noGrp="1"/>
+          </p:cNvSpPr>
+          <p:nvPr>
+            <p:ph type="body" idx="1"/>
+          </p:nvPr>
+        </p:nvSpPr>
+        <p:spPr/>
+        <p:txBody>
+          <a:bodyPr/>
+          <a:lstStyle/>
+          <a:p>
+            <a:endParaRPr lang="en-US" dirty="0"/>
+          </a:p>
+        </p:txBody>
+      </p:sp>
+      <p:sp>
+        <p:nvSpPr>
+          <p:cNvPr id="4" name="Substituent număr diapozitiv 3"/>
+          <p:cNvSpPr>
+            <a:spLocks noGrp="1"/>
+          </p:cNvSpPr>
+          <p:nvPr>
+            <p:ph type="sldNum" sz="quarter" idx="5"/>
+          </p:nvPr>
+        </p:nvSpPr>
+        <p:spPr/>
+        <p:txBody>
+          <a:bodyPr/>
+          <a:lstStyle/>
+          <a:p>
+            <a:fld id="{39C13B9E-123D-412D-A459-0F0A854DD546}" type="slidenum">
+              <a:rPr lang="en-US" smtClean="0"/>
+              <a:t>1</a:t>
+            </a:fld>
+            <a:endParaRPr lang="en-US"/>
+          </a:p>
+        </p:txBody>
+      </p:sp>
+    </p:spTree>
+    <p:extLst>
+      <p:ext uri="{BB962C8B-B14F-4D97-AF65-F5344CB8AC3E}">
+        <p14:creationId xmlns:p14="http://schemas.microsoft.com/office/powerpoint/2010/main" val="2045742286"/>
+      </p:ext>
+    </p:extLst>
+  </p:cSld>
+  <p:clrMapOvr>
+    <a:masterClrMapping/>
+  </p:clrMapOvr>
+</p:notes>
+</file>
+
+<file path=ppt/notesSlides/notesSlide2.xml><?xml version="1.0" encoding="utf-8"?>
+<p:notes xmlns:a="http://schemas.openxmlformats.org/drawingml/2006/main" xmlns:r="http://schemas.openxmlformats.org/officeDocument/2006/relationships" xmlns:p="http://schemas.openxmlformats.org/presentationml/2006/main">
+  <p:cSld>
+    <p:spTree>
+      <p:nvGrpSpPr>
+        <p:cNvPr id="1" name=""/>
+        <p:cNvGrpSpPr/>
+        <p:nvPr/>
+      </p:nvGrpSpPr>
+      <p:grpSpPr>
+        <a:xfrm>
+          <a:off x="0" y="0"/>
+          <a:ext cx="0" cy="0"/>
+          <a:chOff x="0" y="0"/>
+          <a:chExt cx="0" cy="0"/>
+        </a:xfrm>
+      </p:grpSpPr>
+      <p:sp>
+        <p:nvSpPr>
+          <p:cNvPr id="2" name="Substituent imagine diapozitiv 1"/>
+          <p:cNvSpPr>
+            <a:spLocks noGrp="1" noRot="1" noChangeAspect="1"/>
+          </p:cNvSpPr>
+          <p:nvPr>
+            <p:ph type="sldImg"/>
+          </p:nvPr>
+        </p:nvSpPr>
+        <p:spPr/>
+      </p:sp>
+      <p:sp>
+        <p:nvSpPr>
+          <p:cNvPr id="3" name="Substituent note 2"/>
+          <p:cNvSpPr>
+            <a:spLocks noGrp="1"/>
+          </p:cNvSpPr>
+          <p:nvPr>
+            <p:ph type="body" idx="1"/>
+          </p:nvPr>
+        </p:nvSpPr>
+        <p:spPr/>
+        <p:txBody>
+          <a:bodyPr/>
+          <a:lstStyle/>
+          <a:p>
+            <a:r>
+              <a:rPr lang="en-US" sz="1600" dirty="0" err="1">
+                <a:latin typeface="Times New Roman" panose="02020603050405020304" pitchFamily="18" charset="0"/>
+                <a:cs typeface="Times New Roman" panose="02020603050405020304" pitchFamily="18" charset="0"/>
+              </a:rPr>
+              <a:t>Pornind</a:t>
+            </a:r>
+            <a:r>
+              <a:rPr lang="en-US" sz="1600" dirty="0">
+                <a:latin typeface="Times New Roman" panose="02020603050405020304" pitchFamily="18" charset="0"/>
+                <a:cs typeface="Times New Roman" panose="02020603050405020304" pitchFamily="18" charset="0"/>
+              </a:rPr>
+              <a:t> de la </a:t>
+            </a:r>
+            <a:r>
+              <a:rPr lang="en-US" sz="1600" dirty="0" err="1">
+                <a:latin typeface="Times New Roman" panose="02020603050405020304" pitchFamily="18" charset="0"/>
+                <a:cs typeface="Times New Roman" panose="02020603050405020304" pitchFamily="18" charset="0"/>
+              </a:rPr>
+              <a:t>premisa</a:t>
+            </a:r>
+            <a:r>
+              <a:rPr lang="en-US" sz="1600" dirty="0">
+                <a:latin typeface="Times New Roman" panose="02020603050405020304" pitchFamily="18" charset="0"/>
+                <a:cs typeface="Times New Roman" panose="02020603050405020304" pitchFamily="18" charset="0"/>
+              </a:rPr>
+              <a:t> c</a:t>
+            </a:r>
+            <a:r>
+              <a:rPr lang="ro-RO" sz="1600" dirty="0">
+                <a:latin typeface="Times New Roman" panose="02020603050405020304" pitchFamily="18" charset="0"/>
+                <a:cs typeface="Times New Roman" panose="02020603050405020304" pitchFamily="18" charset="0"/>
+              </a:rPr>
+              <a:t>ă</a:t>
+            </a:r>
+            <a:r>
+              <a:rPr lang="en-US" sz="1600" dirty="0">
+                <a:latin typeface="Times New Roman" panose="02020603050405020304" pitchFamily="18" charset="0"/>
+                <a:cs typeface="Times New Roman" panose="02020603050405020304" pitchFamily="18" charset="0"/>
+              </a:rPr>
+              <a:t> </a:t>
+            </a:r>
+            <a:r>
+              <a:rPr lang="en-US" sz="1600" dirty="0" err="1">
+                <a:latin typeface="Times New Roman" panose="02020603050405020304" pitchFamily="18" charset="0"/>
+                <a:cs typeface="Times New Roman" panose="02020603050405020304" pitchFamily="18" charset="0"/>
+              </a:rPr>
+              <a:t>citatul</a:t>
+            </a:r>
+            <a:r>
+              <a:rPr lang="en-US" sz="1600" dirty="0">
+                <a:latin typeface="Times New Roman" panose="02020603050405020304" pitchFamily="18" charset="0"/>
+                <a:cs typeface="Times New Roman" panose="02020603050405020304" pitchFamily="18" charset="0"/>
+              </a:rPr>
+              <a:t> </a:t>
+            </a:r>
+            <a:r>
+              <a:rPr lang="en-US" sz="1600" dirty="0" err="1">
+                <a:latin typeface="Times New Roman" panose="02020603050405020304" pitchFamily="18" charset="0"/>
+                <a:cs typeface="Times New Roman" panose="02020603050405020304" pitchFamily="18" charset="0"/>
+              </a:rPr>
+              <a:t>lui</a:t>
+            </a:r>
+            <a:r>
+              <a:rPr lang="en-US" sz="1600" dirty="0">
+                <a:latin typeface="Times New Roman" panose="02020603050405020304" pitchFamily="18" charset="0"/>
+                <a:cs typeface="Times New Roman" panose="02020603050405020304" pitchFamily="18" charset="0"/>
+              </a:rPr>
+              <a:t> Tom Stoppard </a:t>
+            </a:r>
+            <a:r>
+              <a:rPr lang="en-US" sz="1600" dirty="0" err="1">
+                <a:latin typeface="Times New Roman" panose="02020603050405020304" pitchFamily="18" charset="0"/>
+                <a:cs typeface="Times New Roman" panose="02020603050405020304" pitchFamily="18" charset="0"/>
+              </a:rPr>
+              <a:t>ce</a:t>
+            </a:r>
+            <a:r>
+              <a:rPr lang="en-US" sz="1600" dirty="0">
+                <a:latin typeface="Times New Roman" panose="02020603050405020304" pitchFamily="18" charset="0"/>
+                <a:cs typeface="Times New Roman" panose="02020603050405020304" pitchFamily="18" charset="0"/>
+              </a:rPr>
+              <a:t> </a:t>
+            </a:r>
+            <a:r>
+              <a:rPr lang="en-US" sz="1600" dirty="0" err="1">
+                <a:latin typeface="Times New Roman" panose="02020603050405020304" pitchFamily="18" charset="0"/>
+                <a:cs typeface="Times New Roman" panose="02020603050405020304" pitchFamily="18" charset="0"/>
+              </a:rPr>
+              <a:t>afirm</a:t>
+            </a:r>
+            <a:r>
+              <a:rPr lang="ro-RO" sz="1600" dirty="0">
+                <a:latin typeface="Times New Roman" panose="02020603050405020304" pitchFamily="18" charset="0"/>
+                <a:cs typeface="Times New Roman" panose="02020603050405020304" pitchFamily="18" charset="0"/>
+              </a:rPr>
+              <a:t>ă</a:t>
+            </a:r>
+            <a:r>
+              <a:rPr lang="en-US" sz="1600" dirty="0">
+                <a:latin typeface="Times New Roman" panose="02020603050405020304" pitchFamily="18" charset="0"/>
+                <a:cs typeface="Times New Roman" panose="02020603050405020304" pitchFamily="18" charset="0"/>
+              </a:rPr>
+              <a:t> c</a:t>
+            </a:r>
+            <a:r>
+              <a:rPr lang="ro-RO" sz="1600" dirty="0">
+                <a:latin typeface="Times New Roman" panose="02020603050405020304" pitchFamily="18" charset="0"/>
+                <a:cs typeface="Times New Roman" panose="02020603050405020304" pitchFamily="18" charset="0"/>
+              </a:rPr>
+              <a:t>ă</a:t>
+            </a:r>
+            <a:r>
+              <a:rPr lang="en-US" sz="1600" dirty="0">
+                <a:latin typeface="Times New Roman" panose="02020603050405020304" pitchFamily="18" charset="0"/>
+                <a:cs typeface="Times New Roman" panose="02020603050405020304" pitchFamily="18" charset="0"/>
+              </a:rPr>
+              <a:t> “</a:t>
+            </a:r>
+            <a:r>
+              <a:rPr lang="en-US" sz="1600" dirty="0" err="1">
+                <a:latin typeface="Times New Roman" panose="02020603050405020304" pitchFamily="18" charset="0"/>
+                <a:cs typeface="Times New Roman" panose="02020603050405020304" pitchFamily="18" charset="0"/>
+              </a:rPr>
+              <a:t>Democra</a:t>
+            </a:r>
+            <a:r>
+              <a:rPr lang="ro-RO" sz="1600" dirty="0">
+                <a:latin typeface="Times New Roman" panose="02020603050405020304" pitchFamily="18" charset="0"/>
+                <a:cs typeface="Times New Roman" panose="02020603050405020304" pitchFamily="18" charset="0"/>
+              </a:rPr>
+              <a:t>ț</a:t>
+            </a:r>
+            <a:r>
+              <a:rPr lang="en-US" sz="1600" dirty="0" err="1">
+                <a:latin typeface="Times New Roman" panose="02020603050405020304" pitchFamily="18" charset="0"/>
+                <a:cs typeface="Times New Roman" panose="02020603050405020304" pitchFamily="18" charset="0"/>
+              </a:rPr>
+              <a:t>ia</a:t>
+            </a:r>
+            <a:r>
+              <a:rPr lang="en-US" sz="1600" dirty="0">
+                <a:latin typeface="Times New Roman" panose="02020603050405020304" pitchFamily="18" charset="0"/>
+                <a:cs typeface="Times New Roman" panose="02020603050405020304" pitchFamily="18" charset="0"/>
+              </a:rPr>
+              <a:t> nu </a:t>
+            </a:r>
+            <a:r>
+              <a:rPr lang="en-US" sz="1600" dirty="0" err="1">
+                <a:latin typeface="Times New Roman" panose="02020603050405020304" pitchFamily="18" charset="0"/>
+                <a:cs typeface="Times New Roman" panose="02020603050405020304" pitchFamily="18" charset="0"/>
+              </a:rPr>
+              <a:t>este</a:t>
+            </a:r>
+            <a:r>
+              <a:rPr lang="en-US" sz="1600" dirty="0">
+                <a:latin typeface="Times New Roman" panose="02020603050405020304" pitchFamily="18" charset="0"/>
+                <a:cs typeface="Times New Roman" panose="02020603050405020304" pitchFamily="18" charset="0"/>
+              </a:rPr>
+              <a:t> </a:t>
+            </a:r>
+            <a:r>
+              <a:rPr lang="en-US" sz="1600" dirty="0" err="1">
+                <a:latin typeface="Times New Roman" panose="02020603050405020304" pitchFamily="18" charset="0"/>
+                <a:cs typeface="Times New Roman" panose="02020603050405020304" pitchFamily="18" charset="0"/>
+              </a:rPr>
+              <a:t>votarea</a:t>
+            </a:r>
+            <a:r>
+              <a:rPr lang="en-US" sz="1600" dirty="0">
+                <a:latin typeface="Times New Roman" panose="02020603050405020304" pitchFamily="18" charset="0"/>
+                <a:cs typeface="Times New Roman" panose="02020603050405020304" pitchFamily="18" charset="0"/>
+              </a:rPr>
+              <a:t>, ci </a:t>
+            </a:r>
+            <a:r>
+              <a:rPr lang="en-US" sz="1600" dirty="0" err="1">
+                <a:latin typeface="Times New Roman" panose="02020603050405020304" pitchFamily="18" charset="0"/>
+                <a:cs typeface="Times New Roman" panose="02020603050405020304" pitchFamily="18" charset="0"/>
+              </a:rPr>
+              <a:t>calcularea</a:t>
+            </a:r>
+            <a:r>
+              <a:rPr lang="en-US" sz="1600" dirty="0">
+                <a:latin typeface="Times New Roman" panose="02020603050405020304" pitchFamily="18" charset="0"/>
+                <a:cs typeface="Times New Roman" panose="02020603050405020304" pitchFamily="18" charset="0"/>
+              </a:rPr>
+              <a:t> </a:t>
+            </a:r>
+            <a:r>
+              <a:rPr lang="en-US" sz="1600" dirty="0" err="1">
+                <a:latin typeface="Times New Roman" panose="02020603050405020304" pitchFamily="18" charset="0"/>
+                <a:cs typeface="Times New Roman" panose="02020603050405020304" pitchFamily="18" charset="0"/>
+              </a:rPr>
+              <a:t>voturilor</a:t>
+            </a:r>
+            <a:r>
+              <a:rPr lang="en-US" sz="1600" dirty="0">
+                <a:latin typeface="Times New Roman" panose="02020603050405020304" pitchFamily="18" charset="0"/>
+                <a:cs typeface="Times New Roman" panose="02020603050405020304" pitchFamily="18" charset="0"/>
+              </a:rPr>
+              <a:t>” </a:t>
+            </a:r>
+            <a:r>
+              <a:rPr lang="ro-RO" sz="1600" dirty="0">
+                <a:latin typeface="Times New Roman" panose="02020603050405020304" pitchFamily="18" charset="0"/>
+                <a:cs typeface="Times New Roman" panose="02020603050405020304" pitchFamily="18" charset="0"/>
+              </a:rPr>
+              <a:t>poate fi combătut, s-a ajuns la </a:t>
+            </a:r>
+            <a:r>
+              <a:rPr lang="ro-RO" sz="1600" dirty="0" err="1">
+                <a:latin typeface="Times New Roman" panose="02020603050405020304" pitchFamily="18" charset="0"/>
+                <a:cs typeface="Times New Roman" panose="02020603050405020304" pitchFamily="18" charset="0"/>
+              </a:rPr>
+              <a:t>dorița</a:t>
+            </a:r>
+            <a:r>
+              <a:rPr lang="ro-RO" sz="1600" dirty="0">
+                <a:latin typeface="Times New Roman" panose="02020603050405020304" pitchFamily="18" charset="0"/>
+                <a:cs typeface="Times New Roman" panose="02020603050405020304" pitchFamily="18" charset="0"/>
+              </a:rPr>
+              <a:t> de a găsi un mod prin care poate fi realizat acest lucru.  Așadar s-a </a:t>
+            </a:r>
+            <a:r>
+              <a:rPr lang="ro-RO" sz="1600" dirty="0" err="1">
+                <a:latin typeface="Times New Roman" panose="02020603050405020304" pitchFamily="18" charset="0"/>
+                <a:cs typeface="Times New Roman" panose="02020603050405020304" pitchFamily="18" charset="0"/>
+              </a:rPr>
+              <a:t>cautat</a:t>
+            </a:r>
+            <a:r>
+              <a:rPr lang="ro-RO" sz="1600" dirty="0">
+                <a:latin typeface="Times New Roman" panose="02020603050405020304" pitchFamily="18" charset="0"/>
+                <a:cs typeface="Times New Roman" panose="02020603050405020304" pitchFamily="18" charset="0"/>
+              </a:rPr>
+              <a:t> o </a:t>
+            </a:r>
+            <a:r>
+              <a:rPr lang="ro-RO" sz="1600" dirty="0" err="1">
+                <a:latin typeface="Times New Roman" panose="02020603050405020304" pitchFamily="18" charset="0"/>
+                <a:cs typeface="Times New Roman" panose="02020603050405020304" pitchFamily="18" charset="0"/>
+              </a:rPr>
+              <a:t>solutie</a:t>
+            </a:r>
+            <a:r>
+              <a:rPr lang="ro-RO" sz="1600" dirty="0">
+                <a:latin typeface="Times New Roman" panose="02020603050405020304" pitchFamily="18" charset="0"/>
+                <a:cs typeface="Times New Roman" panose="02020603050405020304" pitchFamily="18" charset="0"/>
+              </a:rPr>
+              <a:t> de actualitate, prin apelarea la tehnologie.</a:t>
+            </a:r>
+            <a:endParaRPr lang="en-US" sz="1600" dirty="0">
+              <a:latin typeface="Times New Roman" panose="02020603050405020304" pitchFamily="18" charset="0"/>
+              <a:cs typeface="Times New Roman" panose="02020603050405020304" pitchFamily="18" charset="0"/>
+            </a:endParaRPr>
+          </a:p>
+        </p:txBody>
+      </p:sp>
+      <p:sp>
+        <p:nvSpPr>
+          <p:cNvPr id="4" name="Substituent număr diapozitiv 3"/>
+          <p:cNvSpPr>
+            <a:spLocks noGrp="1"/>
+          </p:cNvSpPr>
+          <p:nvPr>
+            <p:ph type="sldNum" sz="quarter" idx="5"/>
+          </p:nvPr>
+        </p:nvSpPr>
+        <p:spPr/>
+        <p:txBody>
+          <a:bodyPr/>
+          <a:lstStyle/>
+          <a:p>
+            <a:fld id="{39C13B9E-123D-412D-A459-0F0A854DD546}" type="slidenum">
+              <a:rPr lang="en-US" smtClean="0"/>
+              <a:t>2</a:t>
+            </a:fld>
+            <a:endParaRPr lang="en-US"/>
+          </a:p>
+        </p:txBody>
+      </p:sp>
+    </p:spTree>
+    <p:extLst>
+      <p:ext uri="{BB962C8B-B14F-4D97-AF65-F5344CB8AC3E}">
+        <p14:creationId xmlns:p14="http://schemas.microsoft.com/office/powerpoint/2010/main" val="2985751197"/>
+      </p:ext>
+    </p:extLst>
+  </p:cSld>
+  <p:clrMapOvr>
+    <a:masterClrMapping/>
+  </p:clrMapOvr>
+</p:notes>
+</file>
+
+<file path=ppt/notesSlides/notesSlide3.xml><?xml version="1.0" encoding="utf-8"?>
+<p:notes xmlns:a="http://schemas.openxmlformats.org/drawingml/2006/main" xmlns:r="http://schemas.openxmlformats.org/officeDocument/2006/relationships" xmlns:p="http://schemas.openxmlformats.org/presentationml/2006/main">
+  <p:cSld>
+    <p:spTree>
+      <p:nvGrpSpPr>
+        <p:cNvPr id="1" name=""/>
+        <p:cNvGrpSpPr/>
+        <p:nvPr/>
+      </p:nvGrpSpPr>
+      <p:grpSpPr>
+        <a:xfrm>
+          <a:off x="0" y="0"/>
+          <a:ext cx="0" cy="0"/>
+          <a:chOff x="0" y="0"/>
+          <a:chExt cx="0" cy="0"/>
+        </a:xfrm>
+      </p:grpSpPr>
+      <p:sp>
+        <p:nvSpPr>
+          <p:cNvPr id="2" name="Substituent imagine diapozitiv 1"/>
+          <p:cNvSpPr>
+            <a:spLocks noGrp="1" noRot="1" noChangeAspect="1"/>
+          </p:cNvSpPr>
+          <p:nvPr>
+            <p:ph type="sldImg"/>
+          </p:nvPr>
+        </p:nvSpPr>
+        <p:spPr/>
+      </p:sp>
+      <p:sp>
+        <p:nvSpPr>
+          <p:cNvPr id="3" name="Substituent note 2"/>
+          <p:cNvSpPr>
+            <a:spLocks noGrp="1"/>
+          </p:cNvSpPr>
+          <p:nvPr>
+            <p:ph type="body" idx="1"/>
+          </p:nvPr>
+        </p:nvSpPr>
+        <p:spPr/>
+        <p:txBody>
+          <a:bodyPr/>
+          <a:lstStyle/>
+          <a:p>
+            <a:r>
+              <a:rPr lang="ro-RO" dirty="0"/>
+              <a:t>Scopul acestei lucrări a fost sa implementez un nou mod de votare, online, unde un votant </a:t>
+            </a:r>
+            <a:r>
+              <a:rPr lang="ro-RO" dirty="0" err="1"/>
+              <a:t>iși</a:t>
+            </a:r>
+            <a:r>
+              <a:rPr lang="ro-RO" dirty="0"/>
+              <a:t> poate crea rapid un cont pe baza introducerii unei poze de buletin, dar si pentru a oferi o numerotare corecta a voturilor. </a:t>
+            </a:r>
+            <a:endParaRPr lang="en-US" dirty="0"/>
+          </a:p>
+        </p:txBody>
+      </p:sp>
+      <p:sp>
+        <p:nvSpPr>
+          <p:cNvPr id="4" name="Substituent număr diapozitiv 3"/>
+          <p:cNvSpPr>
+            <a:spLocks noGrp="1"/>
+          </p:cNvSpPr>
+          <p:nvPr>
+            <p:ph type="sldNum" sz="quarter" idx="5"/>
+          </p:nvPr>
+        </p:nvSpPr>
+        <p:spPr/>
+        <p:txBody>
+          <a:bodyPr/>
+          <a:lstStyle/>
+          <a:p>
+            <a:fld id="{39C13B9E-123D-412D-A459-0F0A854DD546}" type="slidenum">
+              <a:rPr lang="en-US" smtClean="0"/>
+              <a:t>3</a:t>
+            </a:fld>
+            <a:endParaRPr lang="en-US"/>
+          </a:p>
+        </p:txBody>
+      </p:sp>
+    </p:spTree>
+    <p:extLst>
+      <p:ext uri="{BB962C8B-B14F-4D97-AF65-F5344CB8AC3E}">
+        <p14:creationId xmlns:p14="http://schemas.microsoft.com/office/powerpoint/2010/main" val="3264736525"/>
+      </p:ext>
+    </p:extLst>
+  </p:cSld>
+  <p:clrMapOvr>
+    <a:masterClrMapping/>
+  </p:clrMapOvr>
+</p:notes>
+</file>
+
+<file path=ppt/notesSlides/notesSlide4.xml><?xml version="1.0" encoding="utf-8"?>
+<p:notes xmlns:a="http://schemas.openxmlformats.org/drawingml/2006/main" xmlns:r="http://schemas.openxmlformats.org/officeDocument/2006/relationships" xmlns:p="http://schemas.openxmlformats.org/presentationml/2006/main">
+  <p:cSld>
+    <p:spTree>
+      <p:nvGrpSpPr>
+        <p:cNvPr id="1" name=""/>
+        <p:cNvGrpSpPr/>
+        <p:nvPr/>
+      </p:nvGrpSpPr>
+      <p:grpSpPr>
+        <a:xfrm>
+          <a:off x="0" y="0"/>
+          <a:ext cx="0" cy="0"/>
+          <a:chOff x="0" y="0"/>
+          <a:chExt cx="0" cy="0"/>
+        </a:xfrm>
+      </p:grpSpPr>
+      <p:sp>
+        <p:nvSpPr>
+          <p:cNvPr id="2" name="Substituent imagine diapozitiv 1"/>
+          <p:cNvSpPr>
+            <a:spLocks noGrp="1" noRot="1" noChangeAspect="1"/>
+          </p:cNvSpPr>
+          <p:nvPr>
+            <p:ph type="sldImg"/>
+          </p:nvPr>
+        </p:nvSpPr>
+        <p:spPr/>
+      </p:sp>
+      <p:sp>
+        <p:nvSpPr>
+          <p:cNvPr id="3" name="Substituent note 2"/>
+          <p:cNvSpPr>
+            <a:spLocks noGrp="1"/>
+          </p:cNvSpPr>
+          <p:nvPr>
+            <p:ph type="body" idx="1"/>
+          </p:nvPr>
+        </p:nvSpPr>
+        <p:spPr/>
+        <p:txBody>
+          <a:bodyPr/>
+          <a:lstStyle/>
+          <a:p>
+            <a:r>
+              <a:rPr lang="en-US" dirty="0" err="1"/>
+              <a:t>Diagrama</a:t>
+            </a:r>
+            <a:r>
+              <a:rPr lang="en-US" dirty="0"/>
+              <a:t> de context a </a:t>
+            </a:r>
+            <a:r>
+              <a:rPr lang="en-US" dirty="0" err="1"/>
+              <a:t>sistemului</a:t>
+            </a:r>
+            <a:r>
+              <a:rPr lang="en-US" dirty="0"/>
+              <a:t>, </a:t>
+            </a:r>
+            <a:r>
+              <a:rPr lang="en-US" dirty="0" err="1"/>
+              <a:t>reprezinta</a:t>
+            </a:r>
+            <a:r>
+              <a:rPr lang="en-US" dirty="0"/>
+              <a:t> </a:t>
+            </a:r>
+            <a:r>
+              <a:rPr lang="en-US" dirty="0" err="1"/>
+              <a:t>punctul</a:t>
+            </a:r>
+            <a:r>
+              <a:rPr lang="en-US" dirty="0"/>
+              <a:t> de start </a:t>
+            </a:r>
+            <a:r>
+              <a:rPr lang="en-US" dirty="0" err="1"/>
+              <a:t>pentru</a:t>
+            </a:r>
+            <a:r>
+              <a:rPr lang="en-US" dirty="0"/>
+              <a:t> </a:t>
+            </a:r>
+            <a:r>
+              <a:rPr lang="en-US" dirty="0" err="1"/>
+              <a:t>documentarea</a:t>
+            </a:r>
+            <a:r>
+              <a:rPr lang="en-US" dirty="0"/>
+              <a:t> </a:t>
+            </a:r>
+            <a:r>
+              <a:rPr lang="en-US" dirty="0" err="1"/>
+              <a:t>sistemului</a:t>
+            </a:r>
+            <a:r>
+              <a:rPr lang="en-US" dirty="0"/>
+              <a:t> software. In </a:t>
+            </a:r>
+            <a:r>
+              <a:rPr lang="en-US" dirty="0" err="1"/>
+              <a:t>aceasta</a:t>
+            </a:r>
+            <a:r>
+              <a:rPr lang="en-US" dirty="0"/>
+              <a:t> </a:t>
+            </a:r>
+            <a:r>
+              <a:rPr lang="en-US" dirty="0" err="1"/>
+              <a:t>diagrama</a:t>
+            </a:r>
+            <a:r>
+              <a:rPr lang="en-US" dirty="0"/>
+              <a:t> </a:t>
+            </a:r>
+            <a:r>
+              <a:rPr lang="en-US" dirty="0" err="1"/>
+              <a:t>accentul</a:t>
+            </a:r>
+            <a:r>
+              <a:rPr lang="en-US" dirty="0"/>
+              <a:t> nu </a:t>
+            </a:r>
+            <a:r>
+              <a:rPr lang="en-US" dirty="0" err="1"/>
+              <a:t>este</a:t>
+            </a:r>
+            <a:r>
+              <a:rPr lang="en-US" dirty="0"/>
+              <a:t> pus pe </a:t>
+            </a:r>
+            <a:r>
+              <a:rPr lang="en-US" dirty="0" err="1"/>
+              <a:t>modul</a:t>
+            </a:r>
+            <a:r>
+              <a:rPr lang="en-US" dirty="0"/>
+              <a:t> de </a:t>
+            </a:r>
+            <a:r>
+              <a:rPr lang="en-US" dirty="0" err="1"/>
+              <a:t>implementare</a:t>
+            </a:r>
+            <a:r>
+              <a:rPr lang="en-US" dirty="0"/>
+              <a:t> ci pe </a:t>
+            </a:r>
+            <a:r>
+              <a:rPr lang="en-US" dirty="0" err="1"/>
+              <a:t>utilizatorii</a:t>
+            </a:r>
+            <a:r>
+              <a:rPr lang="en-US" dirty="0"/>
+              <a:t> </a:t>
+            </a:r>
+            <a:r>
+              <a:rPr lang="en-US" dirty="0" err="1"/>
+              <a:t>aplicatiei</a:t>
+            </a:r>
+            <a:r>
+              <a:rPr lang="en-US" dirty="0"/>
+              <a:t>( </a:t>
+            </a:r>
+            <a:r>
+              <a:rPr lang="en-US" dirty="0" err="1"/>
+              <a:t>actori</a:t>
+            </a:r>
+            <a:r>
+              <a:rPr lang="en-US" dirty="0"/>
+              <a:t>, </a:t>
+            </a:r>
+            <a:r>
+              <a:rPr lang="en-US" dirty="0" err="1"/>
+              <a:t>roluri</a:t>
+            </a:r>
+            <a:r>
+              <a:rPr lang="en-US" dirty="0"/>
+              <a:t>). In </a:t>
+            </a:r>
+            <a:r>
+              <a:rPr lang="en-US" dirty="0" err="1"/>
+              <a:t>centru</a:t>
+            </a:r>
+            <a:r>
+              <a:rPr lang="en-US" dirty="0"/>
+              <a:t> se </a:t>
+            </a:r>
+            <a:r>
+              <a:rPr lang="en-US" dirty="0" err="1"/>
+              <a:t>afla</a:t>
+            </a:r>
+            <a:r>
+              <a:rPr lang="en-US" dirty="0"/>
+              <a:t> </a:t>
+            </a:r>
+            <a:r>
+              <a:rPr lang="en-US" dirty="0" err="1"/>
+              <a:t>aplicatia</a:t>
+            </a:r>
+            <a:r>
+              <a:rPr lang="en-US" dirty="0"/>
+              <a:t> </a:t>
+            </a:r>
+            <a:r>
+              <a:rPr lang="en-US" dirty="0" err="1"/>
+              <a:t>propriu-zisa</a:t>
+            </a:r>
+            <a:r>
+              <a:rPr lang="en-US" dirty="0"/>
+              <a:t> </a:t>
+            </a:r>
+            <a:r>
+              <a:rPr lang="en-US" dirty="0" err="1"/>
+              <a:t>iar</a:t>
+            </a:r>
+            <a:r>
+              <a:rPr lang="en-US" dirty="0"/>
+              <a:t> pe </a:t>
+            </a:r>
+            <a:r>
+              <a:rPr lang="en-US" dirty="0" err="1"/>
+              <a:t>margini</a:t>
+            </a:r>
+            <a:r>
+              <a:rPr lang="en-US" dirty="0"/>
+              <a:t> </a:t>
+            </a:r>
+            <a:r>
+              <a:rPr lang="en-US" dirty="0" err="1"/>
+              <a:t>este</a:t>
+            </a:r>
+            <a:r>
+              <a:rPr lang="en-US" dirty="0"/>
+              <a:t> </a:t>
+            </a:r>
+            <a:r>
+              <a:rPr lang="en-US" dirty="0" err="1"/>
+              <a:t>inconjurata</a:t>
+            </a:r>
+            <a:r>
+              <a:rPr lang="en-US" dirty="0"/>
+              <a:t> de </a:t>
+            </a:r>
+            <a:r>
+              <a:rPr lang="en-US" dirty="0" err="1"/>
+              <a:t>utilizatori</a:t>
+            </a:r>
+            <a:r>
+              <a:rPr lang="en-US" dirty="0"/>
+              <a:t>.</a:t>
+            </a:r>
+          </a:p>
+        </p:txBody>
+      </p:sp>
+      <p:sp>
+        <p:nvSpPr>
+          <p:cNvPr id="4" name="Substituent număr diapozitiv 3"/>
+          <p:cNvSpPr>
+            <a:spLocks noGrp="1"/>
+          </p:cNvSpPr>
+          <p:nvPr>
+            <p:ph type="sldNum" sz="quarter" idx="5"/>
+          </p:nvPr>
+        </p:nvSpPr>
+        <p:spPr/>
+        <p:txBody>
+          <a:bodyPr/>
+          <a:lstStyle/>
+          <a:p>
+            <a:fld id="{39C13B9E-123D-412D-A459-0F0A854DD546}" type="slidenum">
+              <a:rPr lang="en-US" smtClean="0"/>
+              <a:t>4</a:t>
+            </a:fld>
+            <a:endParaRPr lang="en-US"/>
+          </a:p>
+        </p:txBody>
+      </p:sp>
+    </p:spTree>
+    <p:extLst>
+      <p:ext uri="{BB962C8B-B14F-4D97-AF65-F5344CB8AC3E}">
+        <p14:creationId xmlns:p14="http://schemas.microsoft.com/office/powerpoint/2010/main" val="912801441"/>
+      </p:ext>
+    </p:extLst>
+  </p:cSld>
+  <p:clrMapOvr>
+    <a:masterClrMapping/>
+  </p:clrMapOvr>
+</p:notes>
+</file>
+
+<file path=ppt/notesSlides/notesSlide5.xml><?xml version="1.0" encoding="utf-8"?>
+<p:notes xmlns:a="http://schemas.openxmlformats.org/drawingml/2006/main" xmlns:r="http://schemas.openxmlformats.org/officeDocument/2006/relationships" xmlns:p="http://schemas.openxmlformats.org/presentationml/2006/main">
+  <p:cSld>
+    <p:spTree>
+      <p:nvGrpSpPr>
+        <p:cNvPr id="1" name=""/>
+        <p:cNvGrpSpPr/>
+        <p:nvPr/>
+      </p:nvGrpSpPr>
+      <p:grpSpPr>
+        <a:xfrm>
+          <a:off x="0" y="0"/>
+          <a:ext cx="0" cy="0"/>
+          <a:chOff x="0" y="0"/>
+          <a:chExt cx="0" cy="0"/>
+        </a:xfrm>
+      </p:grpSpPr>
+      <p:sp>
+        <p:nvSpPr>
+          <p:cNvPr id="2" name="Substituent imagine diapozitiv 1"/>
+          <p:cNvSpPr>
+            <a:spLocks noGrp="1" noRot="1" noChangeAspect="1"/>
+          </p:cNvSpPr>
+          <p:nvPr>
+            <p:ph type="sldImg"/>
+          </p:nvPr>
+        </p:nvSpPr>
+        <p:spPr/>
+      </p:sp>
+      <p:sp>
+        <p:nvSpPr>
+          <p:cNvPr id="3" name="Substituent note 2"/>
+          <p:cNvSpPr>
+            <a:spLocks noGrp="1"/>
+          </p:cNvSpPr>
+          <p:nvPr>
+            <p:ph type="body" idx="1"/>
+          </p:nvPr>
+        </p:nvSpPr>
+        <p:spPr/>
+        <p:txBody>
+          <a:bodyPr/>
+          <a:lstStyle/>
+          <a:p>
+            <a:r>
+              <a:rPr lang="ro-RO" dirty="0"/>
+              <a:t>Un container poate fi reprezentat de o aplicație web, de o aplicație web de o singura pagina sau o schemă de baze de date.  În principal, este o componenta ce poate fi rulată separat, ce executa cod sau stochează date. Această diagramă prezinta mai în detaliu arhitectura și modul în care sunt împărțite responsabilitățile. De asemenea, oferă informații despre tehnologiile folosite și cum comunică containerele intre ele.</a:t>
+            </a:r>
+            <a:endParaRPr lang="en-US" dirty="0"/>
+          </a:p>
+        </p:txBody>
+      </p:sp>
+      <p:sp>
+        <p:nvSpPr>
+          <p:cNvPr id="4" name="Substituent număr diapozitiv 3"/>
+          <p:cNvSpPr>
+            <a:spLocks noGrp="1"/>
+          </p:cNvSpPr>
+          <p:nvPr>
+            <p:ph type="sldNum" sz="quarter" idx="5"/>
+          </p:nvPr>
+        </p:nvSpPr>
+        <p:spPr/>
+        <p:txBody>
+          <a:bodyPr/>
+          <a:lstStyle/>
+          <a:p>
+            <a:fld id="{39C13B9E-123D-412D-A459-0F0A854DD546}" type="slidenum">
+              <a:rPr lang="en-US" smtClean="0"/>
+              <a:t>5</a:t>
+            </a:fld>
+            <a:endParaRPr lang="en-US"/>
+          </a:p>
+        </p:txBody>
+      </p:sp>
+    </p:spTree>
+    <p:extLst>
+      <p:ext uri="{BB962C8B-B14F-4D97-AF65-F5344CB8AC3E}">
+        <p14:creationId xmlns:p14="http://schemas.microsoft.com/office/powerpoint/2010/main" val="977430526"/>
+      </p:ext>
+    </p:extLst>
+  </p:cSld>
+  <p:clrMapOvr>
+    <a:masterClrMapping/>
+  </p:clrMapOvr>
+</p:notes>
 </file>
 
 <file path=ppt/slideLayouts/slideLayout1.xml><?xml version="1.0" encoding="utf-8"?>
@@ -839,7 +2091,7 @@
           <a:p>
             <a:fld id="{58E948EA-8C3F-477A-98DE-0ADB704DE244}" type="datetimeFigureOut">
               <a:rPr lang="en-US" smtClean="0"/>
-              <a:t>6/26/2019</a:t>
+              <a:t>7/2/2019</a:t>
             </a:fld>
             <a:endParaRPr lang="en-US"/>
           </a:p>
@@ -1090,7 +2342,7 @@
           <a:p>
             <a:fld id="{58E948EA-8C3F-477A-98DE-0ADB704DE244}" type="datetimeFigureOut">
               <a:rPr lang="en-US" smtClean="0"/>
-              <a:t>6/26/2019</a:t>
+              <a:t>7/2/2019</a:t>
             </a:fld>
             <a:endParaRPr lang="en-US"/>
           </a:p>
@@ -1404,7 +2656,7 @@
           <a:p>
             <a:fld id="{58E948EA-8C3F-477A-98DE-0ADB704DE244}" type="datetimeFigureOut">
               <a:rPr lang="en-US" smtClean="0"/>
-              <a:t>6/26/2019</a:t>
+              <a:t>7/2/2019</a:t>
             </a:fld>
             <a:endParaRPr lang="en-US"/>
           </a:p>
@@ -1745,7 +2997,7 @@
           <a:p>
             <a:fld id="{58E948EA-8C3F-477A-98DE-0ADB704DE244}" type="datetimeFigureOut">
               <a:rPr lang="en-US" smtClean="0"/>
-              <a:t>6/26/2019</a:t>
+              <a:t>7/2/2019</a:t>
             </a:fld>
             <a:endParaRPr lang="en-US"/>
           </a:p>
@@ -2059,7 +3311,7 @@
           <a:p>
             <a:fld id="{58E948EA-8C3F-477A-98DE-0ADB704DE244}" type="datetimeFigureOut">
               <a:rPr lang="en-US" smtClean="0"/>
-              <a:t>6/26/2019</a:t>
+              <a:t>7/2/2019</a:t>
             </a:fld>
             <a:endParaRPr lang="en-US"/>
           </a:p>
@@ -2452,7 +3704,7 @@
           <a:p>
             <a:fld id="{58E948EA-8C3F-477A-98DE-0ADB704DE244}" type="datetimeFigureOut">
               <a:rPr lang="en-US" smtClean="0"/>
-              <a:t>6/26/2019</a:t>
+              <a:t>7/2/2019</a:t>
             </a:fld>
             <a:endParaRPr lang="en-US"/>
           </a:p>
@@ -2622,7 +3874,7 @@
           <a:p>
             <a:fld id="{58E948EA-8C3F-477A-98DE-0ADB704DE244}" type="datetimeFigureOut">
               <a:rPr lang="en-US" smtClean="0"/>
-              <a:t>6/26/2019</a:t>
+              <a:t>7/2/2019</a:t>
             </a:fld>
             <a:endParaRPr lang="en-US"/>
           </a:p>
@@ -2802,7 +4054,7 @@
           <a:p>
             <a:fld id="{58E948EA-8C3F-477A-98DE-0ADB704DE244}" type="datetimeFigureOut">
               <a:rPr lang="en-US" smtClean="0"/>
-              <a:t>6/26/2019</a:t>
+              <a:t>7/2/2019</a:t>
             </a:fld>
             <a:endParaRPr lang="en-US"/>
           </a:p>
@@ -2978,7 +4230,7 @@
           <a:p>
             <a:fld id="{58E948EA-8C3F-477A-98DE-0ADB704DE244}" type="datetimeFigureOut">
               <a:rPr lang="en-US" smtClean="0"/>
-              <a:t>6/26/2019</a:t>
+              <a:t>7/2/2019</a:t>
             </a:fld>
             <a:endParaRPr lang="en-US"/>
           </a:p>
@@ -3225,7 +4477,7 @@
           <a:p>
             <a:fld id="{58E948EA-8C3F-477A-98DE-0ADB704DE244}" type="datetimeFigureOut">
               <a:rPr lang="en-US" smtClean="0"/>
-              <a:t>6/26/2019</a:t>
+              <a:t>7/2/2019</a:t>
             </a:fld>
             <a:endParaRPr lang="en-US"/>
           </a:p>
@@ -3457,7 +4709,7 @@
           <a:p>
             <a:fld id="{58E948EA-8C3F-477A-98DE-0ADB704DE244}" type="datetimeFigureOut">
               <a:rPr lang="en-US" smtClean="0"/>
-              <a:t>6/26/2019</a:t>
+              <a:t>7/2/2019</a:t>
             </a:fld>
             <a:endParaRPr lang="en-US"/>
           </a:p>
@@ -3831,7 +5083,7 @@
           <a:p>
             <a:fld id="{58E948EA-8C3F-477A-98DE-0ADB704DE244}" type="datetimeFigureOut">
               <a:rPr lang="en-US" smtClean="0"/>
-              <a:t>6/26/2019</a:t>
+              <a:t>7/2/2019</a:t>
             </a:fld>
             <a:endParaRPr lang="en-US"/>
           </a:p>
@@ -3954,7 +5206,7 @@
           <a:p>
             <a:fld id="{58E948EA-8C3F-477A-98DE-0ADB704DE244}" type="datetimeFigureOut">
               <a:rPr lang="en-US" smtClean="0"/>
-              <a:t>6/26/2019</a:t>
+              <a:t>7/2/2019</a:t>
             </a:fld>
             <a:endParaRPr lang="en-US"/>
           </a:p>
@@ -4049,7 +5301,7 @@
           <a:p>
             <a:fld id="{58E948EA-8C3F-477A-98DE-0ADB704DE244}" type="datetimeFigureOut">
               <a:rPr lang="en-US" smtClean="0"/>
-              <a:t>6/26/2019</a:t>
+              <a:t>7/2/2019</a:t>
             </a:fld>
             <a:endParaRPr lang="en-US"/>
           </a:p>
@@ -4304,7 +5556,7 @@
           <a:p>
             <a:fld id="{58E948EA-8C3F-477A-98DE-0ADB704DE244}" type="datetimeFigureOut">
               <a:rPr lang="en-US" smtClean="0"/>
-              <a:t>6/26/2019</a:t>
+              <a:t>7/2/2019</a:t>
             </a:fld>
             <a:endParaRPr lang="en-US"/>
           </a:p>
@@ -4567,7 +5819,7 @@
           <a:p>
             <a:fld id="{58E948EA-8C3F-477A-98DE-0ADB704DE244}" type="datetimeFigureOut">
               <a:rPr lang="en-US" smtClean="0"/>
-              <a:t>6/26/2019</a:t>
+              <a:t>7/2/2019</a:t>
             </a:fld>
             <a:endParaRPr lang="en-US"/>
           </a:p>
@@ -5310,7 +6562,7 @@
           <a:p>
             <a:fld id="{58E948EA-8C3F-477A-98DE-0ADB704DE244}" type="datetimeFigureOut">
               <a:rPr lang="en-US" smtClean="0"/>
-              <a:t>6/26/2019</a:t>
+              <a:t>7/2/2019</a:t>
             </a:fld>
             <a:endParaRPr lang="en-US"/>
           </a:p>
@@ -5866,7 +7118,7 @@
               <a:t>Voteaz</a:t>
             </a:r>
             <a:r>
-              <a:rPr lang="ro-RO"/>
+              <a:rPr lang="ro-RO" dirty="0"/>
               <a:t>ă</a:t>
             </a:r>
             <a:endParaRPr lang="en-US" dirty="0"/>
@@ -6349,7 +7601,39 @@
           </a:bodyPr>
           <a:lstStyle/>
           <a:p>
-            <a:endParaRPr lang="en-US"/>
+            <a:pPr marL="0" indent="0" algn="just">
+              <a:buNone/>
+            </a:pPr>
+            <a:r>
+              <a:rPr lang="en-US" sz="2400" dirty="0">
+                <a:latin typeface="Times New Roman" panose="02020603050405020304" pitchFamily="18" charset="0"/>
+                <a:cs typeface="Times New Roman" panose="02020603050405020304" pitchFamily="18" charset="0"/>
+              </a:rPr>
+              <a:t>“</a:t>
+            </a:r>
+            <a:r>
+              <a:rPr lang="it-IT" sz="2400" dirty="0">
+                <a:latin typeface="Times New Roman" panose="02020603050405020304" pitchFamily="18" charset="0"/>
+                <a:cs typeface="Times New Roman" panose="02020603050405020304" pitchFamily="18" charset="0"/>
+              </a:rPr>
+              <a:t>Democraţia nu este votarea, ci calcularea voturilor.</a:t>
+            </a:r>
+            <a:r>
+              <a:rPr lang="en-US" sz="2400" dirty="0"/>
+              <a:t>”</a:t>
+            </a:r>
+          </a:p>
+          <a:p>
+            <a:pPr marL="0" indent="0" algn="just">
+              <a:buNone/>
+            </a:pPr>
+            <a:r>
+              <a:rPr lang="en-US" sz="2400" dirty="0">
+                <a:latin typeface="Times New Roman" panose="02020603050405020304" pitchFamily="18" charset="0"/>
+                <a:cs typeface="Times New Roman" panose="02020603050405020304" pitchFamily="18" charset="0"/>
+              </a:rPr>
+              <a:t>					Tom Stoppard</a:t>
+            </a:r>
           </a:p>
         </p:txBody>
       </p:sp>
@@ -6618,7 +7902,70 @@
           </a:bodyPr>
           <a:lstStyle/>
           <a:p>
-            <a:endParaRPr lang="en-US"/>
+            <a:pPr marL="457200" indent="-457200" algn="just">
+              <a:buFont typeface="+mj-lt"/>
+              <a:buAutoNum type="arabicPeriod"/>
+            </a:pPr>
+            <a:r>
+              <a:rPr lang="ro-RO" sz="2400" dirty="0" err="1">
+                <a:latin typeface="Times New Roman" panose="02020603050405020304" pitchFamily="18" charset="0"/>
+                <a:cs typeface="Times New Roman" panose="02020603050405020304" pitchFamily="18" charset="0"/>
+              </a:rPr>
+              <a:t>Research</a:t>
+            </a:r>
+            <a:r>
+              <a:rPr lang="ro-RO" sz="2400" dirty="0">
+                <a:latin typeface="Times New Roman" panose="02020603050405020304" pitchFamily="18" charset="0"/>
+                <a:cs typeface="Times New Roman" panose="02020603050405020304" pitchFamily="18" charset="0"/>
+              </a:rPr>
+              <a:t> asupra sistemelor de vot implementate în afara țării dar și în România.</a:t>
+            </a:r>
+          </a:p>
+          <a:p>
+            <a:pPr marL="457200" indent="-457200" algn="just">
+              <a:buFont typeface="+mj-lt"/>
+              <a:buAutoNum type="arabicPeriod"/>
+            </a:pPr>
+            <a:r>
+              <a:rPr lang="ro-RO" sz="2400" dirty="0" err="1">
+                <a:latin typeface="Times New Roman" panose="02020603050405020304" pitchFamily="18" charset="0"/>
+                <a:cs typeface="Times New Roman" panose="02020603050405020304" pitchFamily="18" charset="0"/>
+              </a:rPr>
+              <a:t>Research</a:t>
+            </a:r>
+            <a:r>
+              <a:rPr lang="ro-RO" sz="2400" dirty="0">
+                <a:latin typeface="Times New Roman" panose="02020603050405020304" pitchFamily="18" charset="0"/>
+                <a:cs typeface="Times New Roman" panose="02020603050405020304" pitchFamily="18" charset="0"/>
+              </a:rPr>
+              <a:t> despre OCR </a:t>
+            </a:r>
+          </a:p>
+          <a:p>
+            <a:pPr marL="457200" indent="-457200" algn="just">
+              <a:buFont typeface="+mj-lt"/>
+              <a:buAutoNum type="arabicPeriod"/>
+            </a:pPr>
+            <a:r>
+              <a:rPr lang="ro-RO" sz="2400" dirty="0">
+                <a:latin typeface="Times New Roman" panose="02020603050405020304" pitchFamily="18" charset="0"/>
+                <a:cs typeface="Times New Roman" panose="02020603050405020304" pitchFamily="18" charset="0"/>
+              </a:rPr>
+              <a:t>Arhitectura și designul aplicației </a:t>
+            </a:r>
+          </a:p>
+          <a:p>
+            <a:pPr marL="457200" indent="-457200" algn="just">
+              <a:buFont typeface="+mj-lt"/>
+              <a:buAutoNum type="arabicPeriod"/>
+            </a:pPr>
+            <a:r>
+              <a:rPr lang="ro-RO" sz="2400" dirty="0">
+                <a:latin typeface="Times New Roman" panose="02020603050405020304" pitchFamily="18" charset="0"/>
+                <a:cs typeface="Times New Roman" panose="02020603050405020304" pitchFamily="18" charset="0"/>
+              </a:rPr>
+              <a:t>Migrarea procesului clasic de votare în mediul online.</a:t>
+            </a:r>
           </a:p>
         </p:txBody>
       </p:sp>
@@ -6806,8 +8153,65 @@
           <a:p>
             <a:r>
               <a:rPr lang="ro-RO" dirty="0"/>
-              <a:t>Arhitectură</a:t>
-            </a:r>
+              <a:t>	Arhitectură</a:t>
+            </a:r>
+            <a:br>
+              <a:rPr lang="ro-RO" dirty="0"/>
+            </a:br>
+            <a:r>
+              <a:rPr lang="ro-RO" sz="1800" dirty="0">
+                <a:latin typeface="Times New Roman" panose="02020603050405020304" pitchFamily="18" charset="0"/>
+                <a:cs typeface="Times New Roman" panose="02020603050405020304" pitchFamily="18" charset="0"/>
+              </a:rPr>
+              <a:t>		     L</a:t>
+            </a:r>
+            <a:r>
+              <a:rPr lang="en-US" sz="1800" dirty="0">
+                <a:latin typeface="Times New Roman" panose="02020603050405020304" pitchFamily="18" charset="0"/>
+                <a:cs typeface="Times New Roman" panose="02020603050405020304" pitchFamily="18" charset="0"/>
+              </a:rPr>
+              <a:t>e</a:t>
+            </a:r>
+            <a:r>
+              <a:rPr lang="ro-RO" sz="1800" dirty="0">
+                <a:latin typeface="Times New Roman" panose="02020603050405020304" pitchFamily="18" charset="0"/>
+                <a:cs typeface="Times New Roman" panose="02020603050405020304" pitchFamily="18" charset="0"/>
+              </a:rPr>
+              <a:t>vel</a:t>
+            </a:r>
+            <a:r>
+              <a:rPr lang="en-US" sz="1800" dirty="0">
+                <a:latin typeface="Times New Roman" panose="02020603050405020304" pitchFamily="18" charset="0"/>
+                <a:cs typeface="Times New Roman" panose="02020603050405020304" pitchFamily="18" charset="0"/>
+              </a:rPr>
+              <a:t> 1</a:t>
+            </a:r>
+            <a:br>
+              <a:rPr lang="ro-RO" sz="1800" dirty="0">
+                <a:latin typeface="Times New Roman" panose="02020603050405020304" pitchFamily="18" charset="0"/>
+                <a:cs typeface="Times New Roman" panose="02020603050405020304" pitchFamily="18" charset="0"/>
+              </a:rPr>
+            </a:br>
+            <a:r>
+              <a:rPr lang="ro-RO" sz="1800" dirty="0">
+                <a:latin typeface="Times New Roman" panose="02020603050405020304" pitchFamily="18" charset="0"/>
+                <a:cs typeface="Times New Roman" panose="02020603050405020304" pitchFamily="18" charset="0"/>
+              </a:rPr>
+              <a:t>	</a:t>
+            </a:r>
+            <a:r>
+              <a:rPr lang="en-US" sz="1800" dirty="0">
+                <a:latin typeface="Times New Roman" panose="02020603050405020304" pitchFamily="18" charset="0"/>
+                <a:cs typeface="Times New Roman" panose="02020603050405020304" pitchFamily="18" charset="0"/>
+              </a:rPr>
+              <a:t>System Context diagram</a:t>
+            </a:r>
+            <a:br>
+              <a:rPr lang="ro-RO" dirty="0">
+                <a:latin typeface="Times New Roman" panose="02020603050405020304" pitchFamily="18" charset="0"/>
+                <a:cs typeface="Times New Roman" panose="02020603050405020304" pitchFamily="18" charset="0"/>
+              </a:rPr>
+            </a:br>
             <a:endParaRPr lang="en-US" dirty="0"/>
           </a:p>
         </p:txBody>
@@ -6943,7 +8347,25 @@
           </a:bodyPr>
           <a:lstStyle/>
           <a:p>
-            <a:endParaRPr lang="en-US"/>
+            <a:pPr marL="0" indent="0" algn="just">
+              <a:buNone/>
+            </a:pPr>
+            <a:endParaRPr lang="en-US" sz="2400" dirty="0">
+              <a:latin typeface="Times New Roman" panose="02020603050405020304" pitchFamily="18" charset="0"/>
+              <a:cs typeface="Times New Roman" panose="02020603050405020304" pitchFamily="18" charset="0"/>
+            </a:endParaRPr>
+          </a:p>
+          <a:p>
+            <a:pPr marL="0" indent="0" algn="just">
+              <a:buNone/>
+            </a:pPr>
+            <a:r>
+              <a:rPr lang="en-US" sz="2400" dirty="0">
+                <a:latin typeface="Times New Roman" panose="02020603050405020304" pitchFamily="18" charset="0"/>
+                <a:cs typeface="Times New Roman" panose="02020603050405020304" pitchFamily="18" charset="0"/>
+              </a:rPr>
+              <a:t> </a:t>
+            </a:r>
           </a:p>
         </p:txBody>
       </p:sp>
@@ -7003,6 +8425,36 @@
           </a:fontRef>
         </p:style>
       </p:sp>
+      <p:pic>
+        <p:nvPicPr>
+          <p:cNvPr id="4" name="Imagine 3">
+            <a:extLst>
+              <a:ext uri="{FF2B5EF4-FFF2-40B4-BE49-F238E27FC236}">
+                <a16:creationId xmlns:a16="http://schemas.microsoft.com/office/drawing/2014/main" id="{54A9F619-1D41-4377-AACB-0CF0847449BA}"/>
+              </a:ext>
+            </a:extLst>
+          </p:cNvPr>
+          <p:cNvPicPr>
+            <a:picLocks noChangeAspect="1"/>
+          </p:cNvPicPr>
+          <p:nvPr/>
+        </p:nvPicPr>
+        <p:blipFill>
+          <a:blip r:embed="rId3"/>
+          <a:stretch>
+            <a:fillRect/>
+          </a:stretch>
+        </p:blipFill>
+        <p:spPr>
+          <a:xfrm>
+            <a:off x="4895260" y="522993"/>
+            <a:ext cx="6585975" cy="5812014"/>
+          </a:xfrm>
+          <a:prstGeom prst="rect">
+            <a:avLst/>
+          </a:prstGeom>
+        </p:spPr>
+      </p:pic>
     </p:spTree>
     <p:extLst>
       <p:ext uri="{BB962C8B-B14F-4D97-AF65-F5344CB8AC3E}">
@@ -7131,12 +8583,68 @@
           <a:p>
             <a:r>
               <a:rPr lang="ro-RO" dirty="0"/>
-              <a:t>Prezentare </a:t>
-            </a:r>
-            <a:r>
-              <a:rPr lang="ro-RO" dirty="0" err="1"/>
-              <a:t>Demo</a:t>
-            </a:r>
+              <a:t>	Arhitectură</a:t>
+            </a:r>
+            <a:br>
+              <a:rPr lang="ro-RO" dirty="0"/>
+            </a:br>
+            <a:r>
+              <a:rPr lang="ro-RO" sz="1800" dirty="0"/>
+              <a:t>  			</a:t>
+            </a:r>
+            <a:r>
+              <a:rPr lang="en-US" sz="1800" dirty="0">
+                <a:latin typeface="Times New Roman" panose="02020603050405020304" pitchFamily="18" charset="0"/>
+                <a:cs typeface="Times New Roman" panose="02020603050405020304" pitchFamily="18" charset="0"/>
+              </a:rPr>
+              <a:t>Level</a:t>
+            </a:r>
+            <a:r>
+              <a:rPr lang="ro-RO" sz="1800" dirty="0">
+                <a:latin typeface="Times New Roman" panose="02020603050405020304" pitchFamily="18" charset="0"/>
+                <a:cs typeface="Times New Roman" panose="02020603050405020304" pitchFamily="18" charset="0"/>
+              </a:rPr>
+              <a:t> 2</a:t>
+            </a:r>
+            <a:br>
+              <a:rPr lang="ro-RO" sz="1800" dirty="0">
+                <a:latin typeface="Times New Roman" panose="02020603050405020304" pitchFamily="18" charset="0"/>
+                <a:cs typeface="Times New Roman" panose="02020603050405020304" pitchFamily="18" charset="0"/>
+              </a:rPr>
+            </a:br>
+            <a:r>
+              <a:rPr lang="ro-RO" sz="1800" dirty="0">
+                <a:latin typeface="Times New Roman" panose="02020603050405020304" pitchFamily="18" charset="0"/>
+                <a:cs typeface="Times New Roman" panose="02020603050405020304" pitchFamily="18" charset="0"/>
+              </a:rPr>
+              <a:t>		Container </a:t>
+            </a:r>
+            <a:r>
+              <a:rPr lang="en-US" sz="1800" dirty="0">
+                <a:latin typeface="Times New Roman" panose="02020603050405020304" pitchFamily="18" charset="0"/>
+                <a:cs typeface="Times New Roman" panose="02020603050405020304" pitchFamily="18" charset="0"/>
+              </a:rPr>
+              <a:t>diagram</a:t>
+            </a:r>
+            <a:br>
+              <a:rPr lang="ro-RO" sz="1800" dirty="0">
+                <a:latin typeface="Times New Roman" panose="02020603050405020304" pitchFamily="18" charset="0"/>
+                <a:cs typeface="Times New Roman" panose="02020603050405020304" pitchFamily="18" charset="0"/>
+              </a:rPr>
+            </a:br>
+            <a:r>
+              <a:rPr lang="ro-RO" sz="1800" dirty="0">
+                <a:latin typeface="Times New Roman" panose="02020603050405020304" pitchFamily="18" charset="0"/>
+                <a:cs typeface="Times New Roman" panose="02020603050405020304" pitchFamily="18" charset="0"/>
+              </a:rPr>
+              <a:t>	</a:t>
+            </a:r>
+            <a:br>
+              <a:rPr lang="ro-RO" dirty="0">
+                <a:latin typeface="Times New Roman" panose="02020603050405020304" pitchFamily="18" charset="0"/>
+                <a:cs typeface="Times New Roman" panose="02020603050405020304" pitchFamily="18" charset="0"/>
+              </a:rPr>
+            </a:br>
             <a:endParaRPr lang="en-US" dirty="0"/>
           </a:p>
         </p:txBody>
@@ -7272,7 +8780,25 @@
           </a:bodyPr>
           <a:lstStyle/>
           <a:p>
-            <a:endParaRPr lang="en-US"/>
+            <a:pPr marL="0" indent="0" algn="just">
+              <a:buNone/>
+            </a:pPr>
+            <a:endParaRPr lang="en-US" sz="2400" dirty="0">
+              <a:latin typeface="Times New Roman" panose="02020603050405020304" pitchFamily="18" charset="0"/>
+              <a:cs typeface="Times New Roman" panose="02020603050405020304" pitchFamily="18" charset="0"/>
+            </a:endParaRPr>
+          </a:p>
+          <a:p>
+            <a:pPr marL="0" indent="0" algn="just">
+              <a:buNone/>
+            </a:pPr>
+            <a:r>
+              <a:rPr lang="en-US" sz="2400" dirty="0">
+                <a:latin typeface="Times New Roman" panose="02020603050405020304" pitchFamily="18" charset="0"/>
+                <a:cs typeface="Times New Roman" panose="02020603050405020304" pitchFamily="18" charset="0"/>
+              </a:rPr>
+              <a:t> </a:t>
+            </a:r>
           </a:p>
         </p:txBody>
       </p:sp>
@@ -7332,10 +8858,40 @@
           </a:fontRef>
         </p:style>
       </p:sp>
+      <p:pic>
+        <p:nvPicPr>
+          <p:cNvPr id="7" name="Imagine 6">
+            <a:extLst>
+              <a:ext uri="{FF2B5EF4-FFF2-40B4-BE49-F238E27FC236}">
+                <a16:creationId xmlns:a16="http://schemas.microsoft.com/office/drawing/2014/main" id="{A5CCF2E6-5742-4757-B7A4-E9CACD7398CA}"/>
+              </a:ext>
+            </a:extLst>
+          </p:cNvPr>
+          <p:cNvPicPr>
+            <a:picLocks noChangeAspect="1"/>
+          </p:cNvPicPr>
+          <p:nvPr/>
+        </p:nvPicPr>
+        <p:blipFill>
+          <a:blip r:embed="rId3"/>
+          <a:stretch>
+            <a:fillRect/>
+          </a:stretch>
+        </p:blipFill>
+        <p:spPr>
+          <a:xfrm>
+            <a:off x="4797885" y="987443"/>
+            <a:ext cx="6703082" cy="5100524"/>
+          </a:xfrm>
+          <a:prstGeom prst="rect">
+            <a:avLst/>
+          </a:prstGeom>
+        </p:spPr>
+      </p:pic>
     </p:spTree>
     <p:extLst>
       <p:ext uri="{BB962C8B-B14F-4D97-AF65-F5344CB8AC3E}">
-        <p14:creationId xmlns:p14="http://schemas.microsoft.com/office/powerpoint/2010/main" val="2806783510"/>
+        <p14:creationId xmlns:p14="http://schemas.microsoft.com/office/powerpoint/2010/main" val="348870053"/>
       </p:ext>
     </p:extLst>
   </p:cSld>
@@ -7460,7 +9016,11 @@
           <a:p>
             <a:r>
               <a:rPr lang="ro-RO" dirty="0"/>
-              <a:t>Concluzii</a:t>
+              <a:t>Prezentare </a:t>
+            </a:r>
+            <a:r>
+              <a:rPr lang="ro-RO" dirty="0" err="1"/>
+              <a:t>Demo</a:t>
             </a:r>
             <a:endParaRPr lang="en-US" dirty="0"/>
           </a:p>
@@ -7597,7 +9157,391 @@
           </a:bodyPr>
           <a:lstStyle/>
           <a:p>
+            <a:endParaRPr lang="en-US"/>
+          </a:p>
+        </p:txBody>
+      </p:sp>
+      <p:sp>
+        <p:nvSpPr>
+          <p:cNvPr id="14" name="Isosceles Triangle 13">
+            <a:extLst>
+              <a:ext uri="{FF2B5EF4-FFF2-40B4-BE49-F238E27FC236}">
+                <a16:creationId xmlns:a16="http://schemas.microsoft.com/office/drawing/2014/main" id="{F10FD715-4DCE-4779-B634-EC78315EA213}"/>
+              </a:ext>
+              <a:ext uri="{C183D7F6-B498-43B3-948B-1728B52AA6E4}">
+                <adec:decorative xmlns:adec="http://schemas.microsoft.com/office/drawing/2017/decorative" val="1"/>
+              </a:ext>
+            </a:extLst>
+          </p:cNvPr>
+          <p:cNvSpPr>
+            <a:spLocks noGrp="1" noRot="1" noChangeAspect="1" noMove="1" noResize="1" noEditPoints="1" noAdjustHandles="1" noChangeArrowheads="1" noChangeShapeType="1" noTextEdit="1"/>
+          </p:cNvSpPr>
+          <p:nvPr>
+            <p:extLst>
+              <p:ext uri="{386F3935-93C4-4BCD-93E2-E3B085C9AB24}">
+                <p16:designElem xmlns:p16="http://schemas.microsoft.com/office/powerpoint/2015/main" val="1"/>
+              </p:ext>
+            </p:extLst>
+          </p:nvPr>
+        </p:nvSpPr>
+        <p:spPr>
+          <a:xfrm rot="10800000" flipH="1">
+            <a:off x="11364139" y="0"/>
+            <a:ext cx="842596" cy="4616289"/>
+          </a:xfrm>
+          <a:prstGeom prst="triangle">
+            <a:avLst>
+              <a:gd name="adj" fmla="val 100000"/>
+            </a:avLst>
+          </a:prstGeom>
+          <a:solidFill>
+            <a:schemeClr val="accent2"/>
+          </a:solidFill>
+          <a:ln>
+            <a:noFill/>
+          </a:ln>
+          <a:effectLst/>
+        </p:spPr>
+        <p:style>
+          <a:lnRef idx="1">
+            <a:schemeClr val="accent1"/>
+          </a:lnRef>
+          <a:fillRef idx="3">
+            <a:schemeClr val="accent1"/>
+          </a:fillRef>
+          <a:effectRef idx="2">
+            <a:schemeClr val="accent1"/>
+          </a:effectRef>
+          <a:fontRef idx="minor">
+            <a:schemeClr val="lt1"/>
+          </a:fontRef>
+        </p:style>
+      </p:sp>
+    </p:spTree>
+    <p:extLst>
+      <p:ext uri="{BB962C8B-B14F-4D97-AF65-F5344CB8AC3E}">
+        <p14:creationId xmlns:p14="http://schemas.microsoft.com/office/powerpoint/2010/main" val="2806783510"/>
+      </p:ext>
+    </p:extLst>
+  </p:cSld>
+  <p:clrMapOvr>
+    <a:masterClrMapping/>
+  </p:clrMapOvr>
+</p:sld>
+</file>
+
+<file path=ppt/slides/slide7.xml><?xml version="1.0" encoding="utf-8"?>
+<p:sld xmlns:a="http://schemas.openxmlformats.org/drawingml/2006/main" xmlns:r="http://schemas.openxmlformats.org/officeDocument/2006/relationships" xmlns:p="http://schemas.openxmlformats.org/presentationml/2006/main">
+  <p:cSld>
+    <p:bg>
+      <p:bgPr>
+        <a:solidFill>
+          <a:schemeClr val="bg1"/>
+        </a:solidFill>
+        <a:effectLst/>
+      </p:bgPr>
+    </p:bg>
+    <p:spTree>
+      <p:nvGrpSpPr>
+        <p:cNvPr id="1" name=""/>
+        <p:cNvGrpSpPr/>
+        <p:nvPr/>
+      </p:nvGrpSpPr>
+      <p:grpSpPr>
+        <a:xfrm>
+          <a:off x="0" y="0"/>
+          <a:ext cx="0" cy="0"/>
+          <a:chOff x="0" y="0"/>
+          <a:chExt cx="0" cy="0"/>
+        </a:xfrm>
+      </p:grpSpPr>
+      <p:sp useBgFill="1">
+        <p:nvSpPr>
+          <p:cNvPr id="8" name="Rectangle 7">
+            <a:extLst>
+              <a:ext uri="{FF2B5EF4-FFF2-40B4-BE49-F238E27FC236}">
+                <a16:creationId xmlns:a16="http://schemas.microsoft.com/office/drawing/2014/main" id="{603AE127-802C-459A-A612-DB85B67F0DC0}"/>
+              </a:ext>
+              <a:ext uri="{C183D7F6-B498-43B3-948B-1728B52AA6E4}">
+                <adec:decorative xmlns:adec="http://schemas.microsoft.com/office/drawing/2017/decorative" val="1"/>
+              </a:ext>
+            </a:extLst>
+          </p:cNvPr>
+          <p:cNvSpPr>
+            <a:spLocks noGrp="1" noRot="1" noChangeAspect="1" noMove="1" noResize="1" noEditPoints="1" noAdjustHandles="1" noChangeArrowheads="1" noChangeShapeType="1" noTextEdit="1"/>
+          </p:cNvSpPr>
+          <p:nvPr>
+            <p:extLst>
+              <p:ext uri="{386F3935-93C4-4BCD-93E2-E3B085C9AB24}">
+                <p16:designElem xmlns:p16="http://schemas.microsoft.com/office/powerpoint/2015/main" val="1"/>
+              </p:ext>
+            </p:extLst>
+          </p:nvPr>
+        </p:nvSpPr>
+        <p:spPr>
+          <a:xfrm>
+            <a:off x="0" y="0"/>
+            <a:ext cx="12192000" cy="6858000"/>
+          </a:xfrm>
+          <a:prstGeom prst="rect">
+            <a:avLst/>
+          </a:prstGeom>
+          <a:ln>
+            <a:noFill/>
+          </a:ln>
+        </p:spPr>
+        <p:style>
+          <a:lnRef idx="2">
+            <a:schemeClr val="accent1">
+              <a:shade val="50000"/>
+            </a:schemeClr>
+          </a:lnRef>
+          <a:fillRef idx="1">
+            <a:schemeClr val="accent1"/>
+          </a:fillRef>
+          <a:effectRef idx="0">
+            <a:schemeClr val="accent1"/>
+          </a:effectRef>
+          <a:fontRef idx="minor">
+            <a:schemeClr val="lt1"/>
+          </a:fontRef>
+        </p:style>
+        <p:txBody>
+          <a:bodyPr rtlCol="0" anchor="ctr"/>
+          <a:lstStyle/>
+          <a:p>
+            <a:pPr algn="ctr"/>
+            <a:endParaRPr lang="en-US"/>
+          </a:p>
+        </p:txBody>
+      </p:sp>
+      <p:sp>
+        <p:nvSpPr>
+          <p:cNvPr id="2" name="Titlu 1">
+            <a:extLst>
+              <a:ext uri="{FF2B5EF4-FFF2-40B4-BE49-F238E27FC236}">
+                <a16:creationId xmlns:a16="http://schemas.microsoft.com/office/drawing/2014/main" id="{D891ADF6-D226-4A99-B721-B044A889848B}"/>
+              </a:ext>
+            </a:extLst>
+          </p:cNvPr>
+          <p:cNvSpPr>
+            <a:spLocks noGrp="1"/>
+          </p:cNvSpPr>
+          <p:nvPr>
+            <p:ph type="title"/>
+          </p:nvPr>
+        </p:nvSpPr>
+        <p:spPr>
+          <a:xfrm>
+            <a:off x="1043950" y="1179151"/>
+            <a:ext cx="3300646" cy="4463889"/>
+          </a:xfrm>
+        </p:spPr>
+        <p:txBody>
+          <a:bodyPr anchor="ctr">
+            <a:normAutofit/>
+          </a:bodyPr>
+          <a:lstStyle/>
+          <a:p>
+            <a:r>
+              <a:rPr lang="ro-RO" dirty="0"/>
+              <a:t>Concluzii</a:t>
+            </a:r>
             <a:endParaRPr lang="en-US" dirty="0"/>
+          </a:p>
+        </p:txBody>
+      </p:sp>
+      <p:sp>
+        <p:nvSpPr>
+          <p:cNvPr id="10" name="Isosceles Triangle 9">
+            <a:extLst>
+              <a:ext uri="{FF2B5EF4-FFF2-40B4-BE49-F238E27FC236}">
+                <a16:creationId xmlns:a16="http://schemas.microsoft.com/office/drawing/2014/main" id="{9323D83D-50D6-4040-A58B-FCEA340F886A}"/>
+              </a:ext>
+              <a:ext uri="{C183D7F6-B498-43B3-948B-1728B52AA6E4}">
+                <adec:decorative xmlns:adec="http://schemas.microsoft.com/office/drawing/2017/decorative" val="1"/>
+              </a:ext>
+            </a:extLst>
+          </p:cNvPr>
+          <p:cNvSpPr>
+            <a:spLocks noGrp="1" noRot="1" noChangeAspect="1" noMove="1" noResize="1" noEditPoints="1" noAdjustHandles="1" noChangeArrowheads="1" noChangeShapeType="1" noTextEdit="1"/>
+          </p:cNvSpPr>
+          <p:nvPr>
+            <p:extLst>
+              <p:ext uri="{386F3935-93C4-4BCD-93E2-E3B085C9AB24}">
+                <p16:designElem xmlns:p16="http://schemas.microsoft.com/office/powerpoint/2015/main" val="1"/>
+              </p:ext>
+            </p:extLst>
+          </p:nvPr>
+        </p:nvSpPr>
+        <p:spPr>
+          <a:xfrm>
+            <a:off x="0" y="4013200"/>
+            <a:ext cx="448733" cy="2844800"/>
+          </a:xfrm>
+          <a:prstGeom prst="triangle">
+            <a:avLst>
+              <a:gd name="adj" fmla="val 0"/>
+            </a:avLst>
+          </a:prstGeom>
+          <a:solidFill>
+            <a:schemeClr val="accent1"/>
+          </a:solidFill>
+          <a:ln>
+            <a:noFill/>
+          </a:ln>
+          <a:effectLst/>
+        </p:spPr>
+        <p:style>
+          <a:lnRef idx="1">
+            <a:schemeClr val="accent1"/>
+          </a:lnRef>
+          <a:fillRef idx="3">
+            <a:schemeClr val="accent1"/>
+          </a:fillRef>
+          <a:effectRef idx="2">
+            <a:schemeClr val="accent1"/>
+          </a:effectRef>
+          <a:fontRef idx="minor">
+            <a:schemeClr val="lt1"/>
+          </a:fontRef>
+        </p:style>
+      </p:sp>
+      <p:cxnSp>
+        <p:nvCxnSpPr>
+          <p:cNvPr id="12" name="Straight Connector 11">
+            <a:extLst>
+              <a:ext uri="{FF2B5EF4-FFF2-40B4-BE49-F238E27FC236}">
+                <a16:creationId xmlns:a16="http://schemas.microsoft.com/office/drawing/2014/main" id="{1A1FE6BB-DFB2-4080-9B5E-076EF5DDE67B}"/>
+              </a:ext>
+              <a:ext uri="{C183D7F6-B498-43B3-948B-1728B52AA6E4}">
+                <adec:decorative xmlns:adec="http://schemas.microsoft.com/office/drawing/2017/decorative" val="1"/>
+              </a:ext>
+            </a:extLst>
+          </p:cNvPr>
+          <p:cNvCxnSpPr>
+            <a:cxnSpLocks noGrp="1" noRot="1" noChangeAspect="1" noMove="1" noResize="1" noEditPoints="1" noAdjustHandles="1" noChangeArrowheads="1" noChangeShapeType="1"/>
+          </p:cNvCxnSpPr>
+          <p:nvPr>
+            <p:extLst>
+              <p:ext uri="{386F3935-93C4-4BCD-93E2-E3B085C9AB24}">
+                <p16:designElem xmlns:p16="http://schemas.microsoft.com/office/powerpoint/2015/main" val="1"/>
+              </p:ext>
+            </p:extLst>
+          </p:nvPr>
+        </p:nvCxnSpPr>
+        <p:spPr>
+          <a:xfrm>
+            <a:off x="4656670" y="1442595"/>
+            <a:ext cx="0" cy="3937000"/>
+          </a:xfrm>
+          <a:prstGeom prst="line">
+            <a:avLst/>
+          </a:prstGeom>
+        </p:spPr>
+        <p:style>
+          <a:lnRef idx="1">
+            <a:schemeClr val="accent1"/>
+          </a:lnRef>
+          <a:fillRef idx="0">
+            <a:schemeClr val="accent1"/>
+          </a:fillRef>
+          <a:effectRef idx="0">
+            <a:schemeClr val="accent1"/>
+          </a:effectRef>
+          <a:fontRef idx="minor">
+            <a:schemeClr val="tx1"/>
+          </a:fontRef>
+        </p:style>
+      </p:cxnSp>
+      <p:sp>
+        <p:nvSpPr>
+          <p:cNvPr id="3" name="Substituent conținut 2">
+            <a:extLst>
+              <a:ext uri="{FF2B5EF4-FFF2-40B4-BE49-F238E27FC236}">
+                <a16:creationId xmlns:a16="http://schemas.microsoft.com/office/drawing/2014/main" id="{BEC20BC6-0417-4C52-97DD-40E245E3C08A}"/>
+              </a:ext>
+            </a:extLst>
+          </p:cNvPr>
+          <p:cNvSpPr>
+            <a:spLocks noGrp="1"/>
+          </p:cNvSpPr>
+          <p:nvPr>
+            <p:ph idx="1"/>
+          </p:nvPr>
+        </p:nvSpPr>
+        <p:spPr>
+          <a:xfrm>
+            <a:off x="4978918" y="1109145"/>
+            <a:ext cx="6341016" cy="4603900"/>
+          </a:xfrm>
+        </p:spPr>
+        <p:txBody>
+          <a:bodyPr anchor="ctr">
+            <a:normAutofit/>
+          </a:bodyPr>
+          <a:lstStyle/>
+          <a:p>
+            <a:pPr marL="457200" indent="-457200" algn="just">
+              <a:buFont typeface="+mj-lt"/>
+              <a:buAutoNum type="arabicPeriod"/>
+            </a:pPr>
+            <a:r>
+              <a:rPr lang="ro-RO" sz="2000" dirty="0">
+                <a:latin typeface="Times New Roman" panose="02020603050405020304" pitchFamily="18" charset="0"/>
+                <a:cs typeface="Times New Roman" panose="02020603050405020304" pitchFamily="18" charset="0"/>
+              </a:rPr>
+              <a:t>Migrarea sistemului clasic de votare pe web.</a:t>
+            </a:r>
+          </a:p>
+          <a:p>
+            <a:pPr marL="457200" indent="-457200" algn="just">
+              <a:buFont typeface="+mj-lt"/>
+              <a:buAutoNum type="arabicPeriod"/>
+            </a:pPr>
+            <a:r>
+              <a:rPr lang="ro-RO" sz="2000" dirty="0">
+                <a:latin typeface="Times New Roman" panose="02020603050405020304" pitchFamily="18" charset="0"/>
+                <a:cs typeface="Times New Roman" panose="02020603050405020304" pitchFamily="18" charset="0"/>
+              </a:rPr>
+              <a:t>Înregistrarea pe baza unui buletin.</a:t>
+            </a:r>
+          </a:p>
+          <a:p>
+            <a:pPr marL="457200" indent="-457200" algn="just">
+              <a:buFont typeface="+mj-lt"/>
+              <a:buAutoNum type="arabicPeriod"/>
+            </a:pPr>
+            <a:r>
+              <a:rPr lang="ro-RO" sz="2000" dirty="0">
+                <a:latin typeface="Times New Roman" panose="02020603050405020304" pitchFamily="18" charset="0"/>
+                <a:cs typeface="Times New Roman" panose="02020603050405020304" pitchFamily="18" charset="0"/>
+              </a:rPr>
+              <a:t>Anonimitatea votantului este păstrată</a:t>
+            </a:r>
+          </a:p>
+          <a:p>
+            <a:pPr marL="457200" indent="-457200" algn="just">
+              <a:buFont typeface="+mj-lt"/>
+              <a:buAutoNum type="arabicPeriod"/>
+            </a:pPr>
+            <a:r>
+              <a:rPr lang="ro-RO" sz="2000" dirty="0">
+                <a:latin typeface="Times New Roman" panose="02020603050405020304" pitchFamily="18" charset="0"/>
+                <a:cs typeface="Times New Roman" panose="02020603050405020304" pitchFamily="18" charset="0"/>
+              </a:rPr>
+              <a:t>Platforma oferă rezultatele pe parcursul campaniei.</a:t>
+            </a:r>
+          </a:p>
+          <a:p>
+            <a:pPr marL="457200" indent="-457200" algn="just">
+              <a:buFont typeface="+mj-lt"/>
+              <a:buAutoNum type="arabicPeriod"/>
+            </a:pPr>
+            <a:endParaRPr lang="en-US" sz="2000" dirty="0">
+              <a:latin typeface="Times New Roman" panose="02020603050405020304" pitchFamily="18" charset="0"/>
+              <a:cs typeface="Times New Roman" panose="02020603050405020304" pitchFamily="18" charset="0"/>
+            </a:endParaRPr>
           </a:p>
         </p:txBody>
       </p:sp>
@@ -7925,4 +9869,299 @@
     </a:ext>
   </a:extLst>
 </a:theme>
+</file>
+
+<file path=ppt/theme/theme2.xml><?xml version="1.0" encoding="utf-8"?>
+<a:theme xmlns:a="http://schemas.openxmlformats.org/drawingml/2006/main" name="Temă Office">
+  <a:themeElements>
+    <a:clrScheme name="Office">
+      <a:dk1>
+        <a:sysClr val="windowText" lastClr="000000"/>
+      </a:dk1>
+      <a:lt1>
+        <a:sysClr val="window" lastClr="FFFFFF"/>
+      </a:lt1>
+      <a:dk2>
+        <a:srgbClr val="44546A"/>
+      </a:dk2>
+      <a:lt2>
+        <a:srgbClr val="E7E6E6"/>
+      </a:lt2>
+      <a:accent1>
+        <a:srgbClr val="4472C4"/>
+      </a:accent1>
+      <a:accent2>
+        <a:srgbClr val="ED7D31"/>
+      </a:accent2>
+      <a:accent3>
+        <a:srgbClr val="A5A5A5"/>
+      </a:accent3>
+      <a:accent4>
+        <a:srgbClr val="FFC000"/>
+      </a:accent4>
+      <a:accent5>
+        <a:srgbClr val="5B9BD5"/>
+      </a:accent5>
+      <a:accent6>
+        <a:srgbClr val="70AD47"/>
+      </a:accent6>
+      <a:hlink>
+        <a:srgbClr val="0563C1"/>
+      </a:hlink>
+      <a:folHlink>
+        <a:srgbClr val="954F72"/>
+      </a:folHlink>
+    </a:clrScheme>
+    <a:fontScheme name="Office">
+      <a:majorFont>
+        <a:latin typeface="Calibri Light" panose="020F0302020204030204"/>
+        <a:ea typeface=""/>
+        <a:cs typeface=""/>
+        <a:font script="Jpan" typeface="游ゴシック Light"/>
+        <a:font script="Hang" typeface="맑은 고딕"/>
+        <a:font script="Hans" typeface="等线 Light"/>
+        <a:font script="Hant" typeface="新細明體"/>
+        <a:font script="Arab" typeface="Times New Roman"/>
+        <a:font script="Hebr" typeface="Times New Roman"/>
+        <a:font script="Thai" typeface="Angsana New"/>
+        <a:font script="Ethi" typeface="Nyala"/>
+        <a:font script="Beng" typeface="Vrinda"/>
+        <a:font script="Gujr" typeface="Shruti"/>
+        <a:font script="Khmr" typeface="MoolBoran"/>
+        <a:font script="Knda" typeface="Tunga"/>
+        <a:font script="Guru" typeface="Raavi"/>
+        <a:font script="Cans" typeface="Euphemia"/>
+        <a:font script="Cher" typeface="Plantagenet Cherokee"/>
+        <a:font script="Yiii" typeface="Microsoft Yi Baiti"/>
+        <a:font script="Tibt" typeface="Microsoft Himalaya"/>
+        <a:font script="Thaa" typeface="MV Boli"/>
+        <a:font script="Deva" typeface="Mangal"/>
+        <a:font script="Telu" typeface="Gautami"/>
+        <a:font script="Taml" typeface="Latha"/>
+        <a:font script="Syrc" typeface="Estrangelo Edessa"/>
+        <a:font script="Orya" typeface="Kalinga"/>
+        <a:font script="Mlym" typeface="Kartika"/>
+        <a:font script="Laoo" typeface="DokChampa"/>
+        <a:font script="Sinh" typeface="Iskoola Pota"/>
+        <a:font script="Mong" typeface="Mongolian Baiti"/>
+        <a:font script="Viet" typeface="Times New Roman"/>
+        <a:font script="Uigh" typeface="Microsoft Uighur"/>
+        <a:font script="Geor" typeface="Sylfaen"/>
+        <a:font script="Armn" typeface="Arial"/>
+        <a:font script="Bugi" typeface="Leelawadee UI"/>
+        <a:font script="Bopo" typeface="Microsoft JhengHei"/>
+        <a:font script="Java" typeface="Javanese Text"/>
+        <a:font script="Lisu" typeface="Segoe UI"/>
+        <a:font script="Mymr" typeface="Myanmar Text"/>
+        <a:font script="Nkoo" typeface="Ebrima"/>
+        <a:font script="Olck" typeface="Nirmala UI"/>
+        <a:font script="Osma" typeface="Ebrima"/>
+        <a:font script="Phag" typeface="Phagspa"/>
+        <a:font script="Syrn" typeface="Estrangelo Edessa"/>
+        <a:font script="Syrj" typeface="Estrangelo Edessa"/>
+        <a:font script="Syre" typeface="Estrangelo Edessa"/>
+        <a:font script="Sora" typeface="Nirmala UI"/>
+        <a:font script="Tale" typeface="Microsoft Tai Le"/>
+        <a:font script="Talu" typeface="Microsoft New Tai Lue"/>
+        <a:font script="Tfng" typeface="Ebrima"/>
+      </a:majorFont>
+      <a:minorFont>
+        <a:latin typeface="Calibri" panose="020F0502020204030204"/>
+        <a:ea typeface=""/>
+        <a:cs typeface=""/>
+        <a:font script="Jpan" typeface="游ゴシック"/>
+        <a:font script="Hang" typeface="맑은 고딕"/>
+        <a:font script="Hans" typeface="等线"/>
+        <a:font script="Hant" typeface="新細明體"/>
+        <a:font script="Arab" typeface="Arial"/>
+        <a:font script="Hebr" typeface="Arial"/>
+        <a:font script="Thai" typeface="Cordia New"/>
+        <a:font script="Ethi" typeface="Nyala"/>
+        <a:font script="Beng" typeface="Vrinda"/>
+        <a:font script="Gujr" typeface="Shruti"/>
+        <a:font script="Khmr" typeface="DaunPenh"/>
+        <a:font script="Knda" typeface="Tunga"/>
+        <a:font script="Guru" typeface="Raavi"/>
+        <a:font script="Cans" typeface="Euphemia"/>
+        <a:font script="Cher" typeface="Plantagenet Cherokee"/>
+        <a:font script="Yiii" typeface="Microsoft Yi Baiti"/>
+        <a:font script="Tibt" typeface="Microsoft Himalaya"/>
+        <a:font script="Thaa" typeface="MV Boli"/>
+        <a:font script="Deva" typeface="Mangal"/>
+        <a:font script="Telu" typeface="Gautami"/>
+        <a:font script="Taml" typeface="Latha"/>
+        <a:font script="Syrc" typeface="Estrangelo Edessa"/>
+        <a:font script="Orya" typeface="Kalinga"/>
+        <a:font script="Mlym" typeface="Kartika"/>
+        <a:font script="Laoo" typeface="DokChampa"/>
+        <a:font script="Sinh" typeface="Iskoola Pota"/>
+        <a:font script="Mong" typeface="Mongolian Baiti"/>
+        <a:font script="Viet" typeface="Arial"/>
+        <a:font script="Uigh" typeface="Microsoft Uighur"/>
+        <a:font script="Geor" typeface="Sylfaen"/>
+        <a:font script="Armn" typeface="Arial"/>
+        <a:font script="Bugi" typeface="Leelawadee UI"/>
+        <a:font script="Bopo" typeface="Microsoft JhengHei"/>
+        <a:font script="Java" typeface="Javanese Text"/>
+        <a:font script="Lisu" typeface="Segoe UI"/>
+        <a:font script="Mymr" typeface="Myanmar Text"/>
+        <a:font script="Nkoo" typeface="Ebrima"/>
+        <a:font script="Olck" typeface="Nirmala UI"/>
+        <a:font script="Osma" typeface="Ebrima"/>
+        <a:font script="Phag" typeface="Phagspa"/>
+        <a:font script="Syrn" typeface="Estrangelo Edessa"/>
+        <a:font script="Syrj" typeface="Estrangelo Edessa"/>
+        <a:font script="Syre" typeface="Estrangelo Edessa"/>
+        <a:font script="Sora" typeface="Nirmala UI"/>
+        <a:font script="Tale" typeface="Microsoft Tai Le"/>
+        <a:font script="Talu" typeface="Microsoft New Tai Lue"/>
+        <a:font script="Tfng" typeface="Ebrima"/>
+      </a:minorFont>
+    </a:fontScheme>
+    <a:fmtScheme name="Office">
+      <a:fillStyleLst>
+        <a:solidFill>
+          <a:schemeClr val="phClr"/>
+        </a:solidFill>
+        <a:gradFill rotWithShape="1">
+          <a:gsLst>
+            <a:gs pos="0">
+              <a:schemeClr val="phClr">
+                <a:lumMod val="110000"/>
+                <a:satMod val="105000"/>
+                <a:tint val="67000"/>
+              </a:schemeClr>
+            </a:gs>
+            <a:gs pos="50000">
+              <a:schemeClr val="phClr">
+                <a:lumMod val="105000"/>
+                <a:satMod val="103000"/>
+                <a:tint val="73000"/>
+              </a:schemeClr>
+            </a:gs>
+            <a:gs pos="100000">
+              <a:schemeClr val="phClr">
+                <a:lumMod val="105000"/>
+                <a:satMod val="109000"/>
+                <a:tint val="81000"/>
+              </a:schemeClr>
+            </a:gs>
+          </a:gsLst>
+          <a:lin ang="5400000" scaled="0"/>
+        </a:gradFill>
+        <a:gradFill rotWithShape="1">
+          <a:gsLst>
+            <a:gs pos="0">
+              <a:schemeClr val="phClr">
+                <a:satMod val="103000"/>
+                <a:lumMod val="102000"/>
+                <a:tint val="94000"/>
+              </a:schemeClr>
+            </a:gs>
+            <a:gs pos="50000">
+              <a:schemeClr val="phClr">
+                <a:satMod val="110000"/>
+                <a:lumMod val="100000"/>
+                <a:shade val="100000"/>
+              </a:schemeClr>
+            </a:gs>
+            <a:gs pos="100000">
+              <a:schemeClr val="phClr">
+                <a:lumMod val="99000"/>
+                <a:satMod val="120000"/>
+                <a:shade val="78000"/>
+              </a:schemeClr>
+            </a:gs>
+          </a:gsLst>
+          <a:lin ang="5400000" scaled="0"/>
+        </a:gradFill>
+      </a:fillStyleLst>
+      <a:lnStyleLst>
+        <a:ln w="6350" cap="flat" cmpd="sng" algn="ctr">
+          <a:solidFill>
+            <a:schemeClr val="phClr"/>
+          </a:solidFill>
+          <a:prstDash val="solid"/>
+          <a:miter lim="800000"/>
+        </a:ln>
+        <a:ln w="12700" cap="flat" cmpd="sng" algn="ctr">
+          <a:solidFill>
+            <a:schemeClr val="phClr"/>
+          </a:solidFill>
+          <a:prstDash val="solid"/>
+          <a:miter lim="800000"/>
+        </a:ln>
+        <a:ln w="19050" cap="flat" cmpd="sng" algn="ctr">
+          <a:solidFill>
+            <a:schemeClr val="phClr"/>
+          </a:solidFill>
+          <a:prstDash val="solid"/>
+          <a:miter lim="800000"/>
+        </a:ln>
+      </a:lnStyleLst>
+      <a:effectStyleLst>
+        <a:effectStyle>
+          <a:effectLst/>
+        </a:effectStyle>
+        <a:effectStyle>
+          <a:effectLst/>
+        </a:effectStyle>
+        <a:effectStyle>
+          <a:effectLst>
+            <a:outerShdw blurRad="57150" dist="19050" dir="5400000" algn="ctr" rotWithShape="0">
+              <a:srgbClr val="000000">
+                <a:alpha val="63000"/>
+              </a:srgbClr>
+            </a:outerShdw>
+          </a:effectLst>
+        </a:effectStyle>
+      </a:effectStyleLst>
+      <a:bgFillStyleLst>
+        <a:solidFill>
+          <a:schemeClr val="phClr"/>
+        </a:solidFill>
+        <a:solidFill>
+          <a:schemeClr val="phClr">
+            <a:tint val="95000"/>
+            <a:satMod val="170000"/>
+          </a:schemeClr>
+        </a:solidFill>
+        <a:gradFill rotWithShape="1">
+          <a:gsLst>
+            <a:gs pos="0">
+              <a:schemeClr val="phClr">
+                <a:tint val="93000"/>
+                <a:satMod val="150000"/>
+                <a:shade val="98000"/>
+                <a:lumMod val="102000"/>
+              </a:schemeClr>
+            </a:gs>
+            <a:gs pos="50000">
+              <a:schemeClr val="phClr">
+                <a:tint val="98000"/>
+                <a:satMod val="130000"/>
+                <a:shade val="90000"/>
+                <a:lumMod val="103000"/>
+              </a:schemeClr>
+            </a:gs>
+            <a:gs pos="100000">
+              <a:schemeClr val="phClr">
+                <a:shade val="63000"/>
+                <a:satMod val="120000"/>
+              </a:schemeClr>
+            </a:gs>
+          </a:gsLst>
+          <a:lin ang="5400000" scaled="0"/>
+        </a:gradFill>
+      </a:bgFillStyleLst>
+    </a:fmtScheme>
+  </a:themeElements>
+  <a:objectDefaults/>
+  <a:extraClrSchemeLst/>
+  <a:extLst>
+    <a:ext uri="{05A4C25C-085E-4340-85A3-A5531E510DB2}">
+      <thm15:themeFamily xmlns:thm15="http://schemas.microsoft.com/office/thememl/2012/main" name="Office Theme" id="{62F939B6-93AF-4DB8-9C6B-D6C7DFDC589F}" vid="{4A3C46E8-61CC-4603-A589-7422A47A8E4A}"/>
+    </a:ext>
+  </a:extLst>
+</a:theme>
 </file>
</xml_diff>